<commit_message>
finished ass1 and added final project draft
</commit_message>
<xml_diff>
--- a/FinalProject/FinalProject.pptx
+++ b/FinalProject/FinalProject.pptx
@@ -8,7 +8,10 @@
     <p:sldId id="256" r:id="rId2"/>
     <p:sldId id="257" r:id="rId3"/>
     <p:sldId id="258" r:id="rId4"/>
-    <p:sldId id="259" r:id="rId5"/>
+    <p:sldId id="261" r:id="rId5"/>
+    <p:sldId id="260" r:id="rId6"/>
+    <p:sldId id="262" r:id="rId7"/>
+    <p:sldId id="259" r:id="rId8"/>
   </p:sldIdLst>
   <p:sldSz cx="12192000" cy="6858000"/>
   <p:notesSz cx="6858000" cy="9144000"/>
@@ -107,6 +110,11 @@
       </a:defRPr>
     </a:lvl9pPr>
   </p:defaultTextStyle>
+  <p:extLst>
+    <p:ext uri="{EFAFB233-063F-42B5-8137-9DF3F51BA10A}">
+      <p15:sldGuideLst xmlns:p15="http://schemas.microsoft.com/office/powerpoint/2012/main"/>
+    </p:ext>
+  </p:extLst>
 </p:presentation>
 </file>
 
@@ -259,7 +267,7 @@
           <a:p>
             <a:fld id="{0FBF1EB2-CB17-4A79-9466-7C3708736DBA}" type="datetimeFigureOut">
               <a:rPr lang="en-IL" smtClean="0"/>
-              <a:t>16/11/2021</a:t>
+              <a:t>11/16/2021</a:t>
             </a:fld>
             <a:endParaRPr lang="en-IL"/>
           </a:p>
@@ -459,7 +467,7 @@
           <a:p>
             <a:fld id="{0FBF1EB2-CB17-4A79-9466-7C3708736DBA}" type="datetimeFigureOut">
               <a:rPr lang="en-IL" smtClean="0"/>
-              <a:t>16/11/2021</a:t>
+              <a:t>11/16/2021</a:t>
             </a:fld>
             <a:endParaRPr lang="en-IL"/>
           </a:p>
@@ -669,7 +677,7 @@
           <a:p>
             <a:fld id="{0FBF1EB2-CB17-4A79-9466-7C3708736DBA}" type="datetimeFigureOut">
               <a:rPr lang="en-IL" smtClean="0"/>
-              <a:t>16/11/2021</a:t>
+              <a:t>11/16/2021</a:t>
             </a:fld>
             <a:endParaRPr lang="en-IL"/>
           </a:p>
@@ -869,7 +877,7 @@
           <a:p>
             <a:fld id="{0FBF1EB2-CB17-4A79-9466-7C3708736DBA}" type="datetimeFigureOut">
               <a:rPr lang="en-IL" smtClean="0"/>
-              <a:t>16/11/2021</a:t>
+              <a:t>11/16/2021</a:t>
             </a:fld>
             <a:endParaRPr lang="en-IL"/>
           </a:p>
@@ -1145,7 +1153,7 @@
           <a:p>
             <a:fld id="{0FBF1EB2-CB17-4A79-9466-7C3708736DBA}" type="datetimeFigureOut">
               <a:rPr lang="en-IL" smtClean="0"/>
-              <a:t>16/11/2021</a:t>
+              <a:t>11/16/2021</a:t>
             </a:fld>
             <a:endParaRPr lang="en-IL"/>
           </a:p>
@@ -1413,7 +1421,7 @@
           <a:p>
             <a:fld id="{0FBF1EB2-CB17-4A79-9466-7C3708736DBA}" type="datetimeFigureOut">
               <a:rPr lang="en-IL" smtClean="0"/>
-              <a:t>16/11/2021</a:t>
+              <a:t>11/16/2021</a:t>
             </a:fld>
             <a:endParaRPr lang="en-IL"/>
           </a:p>
@@ -1828,7 +1836,7 @@
           <a:p>
             <a:fld id="{0FBF1EB2-CB17-4A79-9466-7C3708736DBA}" type="datetimeFigureOut">
               <a:rPr lang="en-IL" smtClean="0"/>
-              <a:t>16/11/2021</a:t>
+              <a:t>11/16/2021</a:t>
             </a:fld>
             <a:endParaRPr lang="en-IL"/>
           </a:p>
@@ -1970,7 +1978,7 @@
           <a:p>
             <a:fld id="{0FBF1EB2-CB17-4A79-9466-7C3708736DBA}" type="datetimeFigureOut">
               <a:rPr lang="en-IL" smtClean="0"/>
-              <a:t>16/11/2021</a:t>
+              <a:t>11/16/2021</a:t>
             </a:fld>
             <a:endParaRPr lang="en-IL"/>
           </a:p>
@@ -2083,7 +2091,7 @@
           <a:p>
             <a:fld id="{0FBF1EB2-CB17-4A79-9466-7C3708736DBA}" type="datetimeFigureOut">
               <a:rPr lang="en-IL" smtClean="0"/>
-              <a:t>16/11/2021</a:t>
+              <a:t>11/16/2021</a:t>
             </a:fld>
             <a:endParaRPr lang="en-IL"/>
           </a:p>
@@ -2396,7 +2404,7 @@
           <a:p>
             <a:fld id="{0FBF1EB2-CB17-4A79-9466-7C3708736DBA}" type="datetimeFigureOut">
               <a:rPr lang="en-IL" smtClean="0"/>
-              <a:t>16/11/2021</a:t>
+              <a:t>11/16/2021</a:t>
             </a:fld>
             <a:endParaRPr lang="en-IL"/>
           </a:p>
@@ -2685,7 +2693,7 @@
           <a:p>
             <a:fld id="{0FBF1EB2-CB17-4A79-9466-7C3708736DBA}" type="datetimeFigureOut">
               <a:rPr lang="en-IL" smtClean="0"/>
-              <a:t>16/11/2021</a:t>
+              <a:t>11/16/2021</a:t>
             </a:fld>
             <a:endParaRPr lang="en-IL"/>
           </a:p>
@@ -2928,7 +2936,7 @@
           <a:p>
             <a:fld id="{0FBF1EB2-CB17-4A79-9466-7C3708736DBA}" type="datetimeFigureOut">
               <a:rPr lang="en-IL" smtClean="0"/>
-              <a:t>16/11/2021</a:t>
+              <a:t>11/16/2021</a:t>
             </a:fld>
             <a:endParaRPr lang="en-IL"/>
           </a:p>
@@ -3934,6 +3942,339 @@
       </p:grpSpPr>
       <p:sp>
         <p:nvSpPr>
+          <p:cNvPr id="2" name="Title 1">
+            <a:extLst>
+              <a:ext uri="{FF2B5EF4-FFF2-40B4-BE49-F238E27FC236}">
+                <a16:creationId xmlns:a16="http://schemas.microsoft.com/office/drawing/2014/main" id="{2512CD09-D57B-468C-A382-371B2A4F90C1}"/>
+              </a:ext>
+            </a:extLst>
+          </p:cNvPr>
+          <p:cNvSpPr>
+            <a:spLocks noGrp="1"/>
+          </p:cNvSpPr>
+          <p:nvPr>
+            <p:ph type="title"/>
+          </p:nvPr>
+        </p:nvSpPr>
+        <p:spPr/>
+        <p:txBody>
+          <a:bodyPr/>
+          <a:lstStyle/>
+          <a:p>
+            <a:pPr algn="l" rtl="0"/>
+            <a:r>
+              <a:rPr lang="en-US" dirty="0"/>
+              <a:t>Method</a:t>
+            </a:r>
+          </a:p>
+        </p:txBody>
+      </p:sp>
+      <p:sp>
+        <p:nvSpPr>
+          <p:cNvPr id="3" name="Content Placeholder 2">
+            <a:extLst>
+              <a:ext uri="{FF2B5EF4-FFF2-40B4-BE49-F238E27FC236}">
+                <a16:creationId xmlns:a16="http://schemas.microsoft.com/office/drawing/2014/main" id="{7006DD66-4050-4406-8766-6D3E3F1C1E50}"/>
+              </a:ext>
+            </a:extLst>
+          </p:cNvPr>
+          <p:cNvSpPr>
+            <a:spLocks noGrp="1"/>
+          </p:cNvSpPr>
+          <p:nvPr>
+            <p:ph idx="1"/>
+          </p:nvPr>
+        </p:nvSpPr>
+        <p:spPr/>
+        <p:txBody>
+          <a:bodyPr/>
+          <a:lstStyle/>
+          <a:p>
+            <a:pPr algn="l" rtl="0"/>
+            <a:r>
+              <a:rPr lang="en-US" dirty="0"/>
+              <a:t>Creating synthetic depth images in simulation</a:t>
+            </a:r>
+          </a:p>
+          <a:p>
+            <a:pPr algn="l" rtl="0"/>
+            <a:r>
+              <a:rPr lang="en-US" dirty="0"/>
+              <a:t>Training a pose estimation pipeline based on deep convolutional neural networks</a:t>
+            </a:r>
+          </a:p>
+          <a:p>
+            <a:pPr algn="l" rtl="0"/>
+            <a:r>
+              <a:rPr lang="en-US" dirty="0"/>
+              <a:t>Estimating the parts’ poses in reality, using a camera mounted near the robot’s end-effector</a:t>
+            </a:r>
+          </a:p>
+          <a:p>
+            <a:pPr algn="l" rtl="0"/>
+            <a:r>
+              <a:rPr lang="en-US" dirty="0"/>
+              <a:t>Calculating pick-and-place motions based on the estimated poses</a:t>
+            </a:r>
+          </a:p>
+        </p:txBody>
+      </p:sp>
+    </p:spTree>
+    <p:extLst>
+      <p:ext uri="{BB962C8B-B14F-4D97-AF65-F5344CB8AC3E}">
+        <p14:creationId xmlns:p14="http://schemas.microsoft.com/office/powerpoint/2010/main" val="862375202"/>
+      </p:ext>
+    </p:extLst>
+  </p:cSld>
+  <p:clrMapOvr>
+    <a:masterClrMapping/>
+  </p:clrMapOvr>
+</p:sld>
+</file>
+
+<file path=ppt/slides/slide5.xml><?xml version="1.0" encoding="utf-8"?>
+<p:sld xmlns:a="http://schemas.openxmlformats.org/drawingml/2006/main" xmlns:r="http://schemas.openxmlformats.org/officeDocument/2006/relationships" xmlns:p="http://schemas.openxmlformats.org/presentationml/2006/main">
+  <p:cSld>
+    <p:spTree>
+      <p:nvGrpSpPr>
+        <p:cNvPr id="1" name=""/>
+        <p:cNvGrpSpPr/>
+        <p:nvPr/>
+      </p:nvGrpSpPr>
+      <p:grpSpPr>
+        <a:xfrm>
+          <a:off x="0" y="0"/>
+          <a:ext cx="0" cy="0"/>
+          <a:chOff x="0" y="0"/>
+          <a:chExt cx="0" cy="0"/>
+        </a:xfrm>
+      </p:grpSpPr>
+      <p:sp>
+        <p:nvSpPr>
+          <p:cNvPr id="2" name="Title 1">
+            <a:extLst>
+              <a:ext uri="{FF2B5EF4-FFF2-40B4-BE49-F238E27FC236}">
+                <a16:creationId xmlns:a16="http://schemas.microsoft.com/office/drawing/2014/main" id="{EEB95EF7-877B-4D2C-AEDF-1BBFC0140AC4}"/>
+              </a:ext>
+            </a:extLst>
+          </p:cNvPr>
+          <p:cNvSpPr>
+            <a:spLocks noGrp="1"/>
+          </p:cNvSpPr>
+          <p:nvPr>
+            <p:ph type="title"/>
+          </p:nvPr>
+        </p:nvSpPr>
+        <p:spPr/>
+        <p:txBody>
+          <a:bodyPr/>
+          <a:lstStyle/>
+          <a:p>
+            <a:pPr algn="l" rtl="0"/>
+            <a:r>
+              <a:rPr lang="en-US" dirty="0"/>
+              <a:t>Results</a:t>
+            </a:r>
+          </a:p>
+        </p:txBody>
+      </p:sp>
+      <p:sp>
+        <p:nvSpPr>
+          <p:cNvPr id="3" name="Content Placeholder 2">
+            <a:extLst>
+              <a:ext uri="{FF2B5EF4-FFF2-40B4-BE49-F238E27FC236}">
+                <a16:creationId xmlns:a16="http://schemas.microsoft.com/office/drawing/2014/main" id="{1DC9551D-272A-4156-9093-FDD778B14C0E}"/>
+              </a:ext>
+            </a:extLst>
+          </p:cNvPr>
+          <p:cNvSpPr>
+            <a:spLocks noGrp="1"/>
+          </p:cNvSpPr>
+          <p:nvPr>
+            <p:ph idx="1"/>
+          </p:nvPr>
+        </p:nvSpPr>
+        <p:spPr/>
+        <p:txBody>
+          <a:bodyPr>
+            <a:normAutofit lnSpcReduction="10000"/>
+          </a:bodyPr>
+          <a:lstStyle/>
+          <a:p>
+            <a:pPr algn="l" rtl="0"/>
+            <a:r>
+              <a:rPr lang="en-US" dirty="0"/>
+              <a:t>Total of 30 experiments.</a:t>
+            </a:r>
+          </a:p>
+          <a:p>
+            <a:pPr algn="l" rtl="0"/>
+            <a:r>
+              <a:rPr lang="en-US" dirty="0"/>
+              <a:t>Pose estimation resulted in an average translational accuracy of 2.14mm and a rotational accuracy of 1.09 degrees.</a:t>
+            </a:r>
+          </a:p>
+          <a:p>
+            <a:pPr algn="l" rtl="0"/>
+            <a:r>
+              <a:rPr lang="en-US" dirty="0"/>
+              <a:t>Out of 150 grasps and attempts to assemble, 133 were successful (88.67%)</a:t>
+            </a:r>
+          </a:p>
+          <a:p>
+            <a:pPr algn="l" rtl="0"/>
+            <a:r>
+              <a:rPr lang="en-US" dirty="0"/>
+              <a:t>In 15 experiments, all parts were successfully assembled (50%).</a:t>
+            </a:r>
+          </a:p>
+          <a:p>
+            <a:pPr algn="l" rtl="0"/>
+            <a:r>
+              <a:rPr lang="en-US" dirty="0"/>
+              <a:t>In 5 of the 15 failed attempts, the gripper succeeded to grasp one of the shafts but let it slip while lifting.</a:t>
+            </a:r>
+          </a:p>
+          <a:p>
+            <a:pPr algn="l" rtl="0"/>
+            <a:r>
+              <a:rPr lang="en-US" dirty="0"/>
+              <a:t>In the remaining 10 attempts, the grasped part contacted the base plate which triggered a search, during which the part slipped</a:t>
+            </a:r>
+          </a:p>
+          <a:p>
+            <a:pPr algn="l" rtl="0"/>
+            <a:endParaRPr lang="en-US" dirty="0"/>
+          </a:p>
+        </p:txBody>
+      </p:sp>
+    </p:spTree>
+    <p:extLst>
+      <p:ext uri="{BB962C8B-B14F-4D97-AF65-F5344CB8AC3E}">
+        <p14:creationId xmlns:p14="http://schemas.microsoft.com/office/powerpoint/2010/main" val="2725942704"/>
+      </p:ext>
+    </p:extLst>
+  </p:cSld>
+  <p:clrMapOvr>
+    <a:masterClrMapping/>
+  </p:clrMapOvr>
+</p:sld>
+</file>
+
+<file path=ppt/slides/slide6.xml><?xml version="1.0" encoding="utf-8"?>
+<p:sld xmlns:a="http://schemas.openxmlformats.org/drawingml/2006/main" xmlns:r="http://schemas.openxmlformats.org/officeDocument/2006/relationships" xmlns:p="http://schemas.openxmlformats.org/presentationml/2006/main">
+  <p:cSld>
+    <p:spTree>
+      <p:nvGrpSpPr>
+        <p:cNvPr id="1" name=""/>
+        <p:cNvGrpSpPr/>
+        <p:nvPr/>
+      </p:nvGrpSpPr>
+      <p:grpSpPr>
+        <a:xfrm>
+          <a:off x="0" y="0"/>
+          <a:ext cx="0" cy="0"/>
+          <a:chOff x="0" y="0"/>
+          <a:chExt cx="0" cy="0"/>
+        </a:xfrm>
+      </p:grpSpPr>
+      <p:sp>
+        <p:nvSpPr>
+          <p:cNvPr id="2" name="Title 1">
+            <a:extLst>
+              <a:ext uri="{FF2B5EF4-FFF2-40B4-BE49-F238E27FC236}">
+                <a16:creationId xmlns:a16="http://schemas.microsoft.com/office/drawing/2014/main" id="{A2DFABF9-1F8F-4AFF-8CE3-12ACDCA901EA}"/>
+              </a:ext>
+            </a:extLst>
+          </p:cNvPr>
+          <p:cNvSpPr>
+            <a:spLocks noGrp="1"/>
+          </p:cNvSpPr>
+          <p:nvPr>
+            <p:ph type="title"/>
+          </p:nvPr>
+        </p:nvSpPr>
+        <p:spPr/>
+        <p:txBody>
+          <a:bodyPr/>
+          <a:lstStyle/>
+          <a:p>
+            <a:pPr algn="l" rtl="0"/>
+            <a:r>
+              <a:rPr lang="en-US" dirty="0"/>
+              <a:t>Conclusion</a:t>
+            </a:r>
+          </a:p>
+        </p:txBody>
+      </p:sp>
+      <p:sp>
+        <p:nvSpPr>
+          <p:cNvPr id="3" name="Content Placeholder 2">
+            <a:extLst>
+              <a:ext uri="{FF2B5EF4-FFF2-40B4-BE49-F238E27FC236}">
+                <a16:creationId xmlns:a16="http://schemas.microsoft.com/office/drawing/2014/main" id="{1612A23E-D17C-4E14-B6FC-42D91266DE72}"/>
+              </a:ext>
+            </a:extLst>
+          </p:cNvPr>
+          <p:cNvSpPr>
+            <a:spLocks noGrp="1"/>
+          </p:cNvSpPr>
+          <p:nvPr>
+            <p:ph idx="1"/>
+          </p:nvPr>
+        </p:nvSpPr>
+        <p:spPr/>
+        <p:txBody>
+          <a:bodyPr/>
+          <a:lstStyle/>
+          <a:p>
+            <a:pPr algn="l" rtl="0"/>
+            <a:r>
+              <a:rPr lang="en-US" dirty="0"/>
+              <a:t>An assembly task with given 3D CAD files, an accurate pose estimation algorithm can be trained to achieve high assembly success rates.</a:t>
+            </a:r>
+          </a:p>
+          <a:p>
+            <a:pPr algn="l" rtl="0"/>
+            <a:r>
+              <a:rPr lang="en-US" dirty="0"/>
+              <a:t>The simulation-to-reality gap can be significantly bridged by using depth images and the assembly task can be learned on simulated images only.</a:t>
+            </a:r>
+          </a:p>
+        </p:txBody>
+      </p:sp>
+    </p:spTree>
+    <p:extLst>
+      <p:ext uri="{BB962C8B-B14F-4D97-AF65-F5344CB8AC3E}">
+        <p14:creationId xmlns:p14="http://schemas.microsoft.com/office/powerpoint/2010/main" val="3944448936"/>
+      </p:ext>
+    </p:extLst>
+  </p:cSld>
+  <p:clrMapOvr>
+    <a:masterClrMapping/>
+  </p:clrMapOvr>
+</p:sld>
+</file>
+
+<file path=ppt/slides/slide7.xml><?xml version="1.0" encoding="utf-8"?>
+<p:sld xmlns:a="http://schemas.openxmlformats.org/drawingml/2006/main" xmlns:r="http://schemas.openxmlformats.org/officeDocument/2006/relationships" xmlns:p="http://schemas.openxmlformats.org/presentationml/2006/main">
+  <p:cSld>
+    <p:spTree>
+      <p:nvGrpSpPr>
+        <p:cNvPr id="1" name=""/>
+        <p:cNvGrpSpPr/>
+        <p:nvPr/>
+      </p:nvGrpSpPr>
+      <p:grpSpPr>
+        <a:xfrm>
+          <a:off x="0" y="0"/>
+          <a:ext cx="0" cy="0"/>
+          <a:chOff x="0" y="0"/>
+          <a:chExt cx="0" cy="0"/>
+        </a:xfrm>
+      </p:grpSpPr>
+      <p:sp>
+        <p:nvSpPr>
           <p:cNvPr id="2" name="כותרת 1">
             <a:extLst>
               <a:ext uri="{FF2B5EF4-FFF2-40B4-BE49-F238E27FC236}">
@@ -3988,19 +4329,32 @@
             <a:pPr algn="l" rtl="0"/>
             <a:r>
               <a:rPr lang="en-US" dirty="0"/>
-              <a:t>The problem was solved with an extremely … point of view, </a:t>
+              <a:t>Each subproblem was solved independently, which will cause more difficult adaption to new domain related problems.</a:t>
             </a:r>
           </a:p>
           <a:p>
             <a:pPr algn="l" rtl="0"/>
             <a:r>
               <a:rPr lang="en-US" dirty="0"/>
-              <a:t>The solution requires a </a:t>
-            </a:r>
-            <a:r>
-              <a:rPr lang="en-US"/>
-              <a:t>CAD model</a:t>
-            </a:r>
+              <a:t>The solution requires a CAD model – which is rarely accessible to the end user which aims to solve the assembly task.</a:t>
+            </a:r>
+          </a:p>
+          <a:p>
+            <a:pPr algn="l" rtl="0"/>
+            <a:r>
+              <a:rPr lang="en-US" dirty="0"/>
+              <a:t>We would suggest a use of reinforcement learning regarding the grip of the parts.</a:t>
+            </a:r>
+          </a:p>
+          <a:p>
+            <a:pPr algn="l" rtl="0"/>
+            <a:r>
+              <a:rPr lang="en-US" dirty="0"/>
+              <a:t>Expand the use of depth information (e.g., point cloud etc.) in order to avoid the need of CAD models.</a:t>
+            </a:r>
+          </a:p>
+          <a:p>
+            <a:pPr algn="l" rtl="0"/>
             <a:endParaRPr lang="en-IL" dirty="0"/>
           </a:p>
         </p:txBody>

</xml_diff>

<commit_message>
finally finished the bunny
</commit_message>
<xml_diff>
--- a/FinalProject/FinalProject.pptx
+++ b/FinalProject/FinalProject.pptx
@@ -9,9 +9,13 @@
     <p:sldId id="257" r:id="rId3"/>
     <p:sldId id="258" r:id="rId4"/>
     <p:sldId id="261" r:id="rId5"/>
-    <p:sldId id="260" r:id="rId6"/>
-    <p:sldId id="262" r:id="rId7"/>
-    <p:sldId id="259" r:id="rId8"/>
+    <p:sldId id="267" r:id="rId6"/>
+    <p:sldId id="266" r:id="rId7"/>
+    <p:sldId id="265" r:id="rId8"/>
+    <p:sldId id="263" r:id="rId9"/>
+    <p:sldId id="268" r:id="rId10"/>
+    <p:sldId id="262" r:id="rId11"/>
+    <p:sldId id="259" r:id="rId12"/>
   </p:sldIdLst>
   <p:sldSz cx="12192000" cy="6858000"/>
   <p:notesSz cx="6858000" cy="9144000"/>
@@ -267,7 +271,7 @@
           <a:p>
             <a:fld id="{0FBF1EB2-CB17-4A79-9466-7C3708736DBA}" type="datetimeFigureOut">
               <a:rPr lang="en-IL" smtClean="0"/>
-              <a:t>11/16/2021</a:t>
+              <a:t>11/20/2021</a:t>
             </a:fld>
             <a:endParaRPr lang="en-IL"/>
           </a:p>
@@ -467,7 +471,7 @@
           <a:p>
             <a:fld id="{0FBF1EB2-CB17-4A79-9466-7C3708736DBA}" type="datetimeFigureOut">
               <a:rPr lang="en-IL" smtClean="0"/>
-              <a:t>11/16/2021</a:t>
+              <a:t>11/20/2021</a:t>
             </a:fld>
             <a:endParaRPr lang="en-IL"/>
           </a:p>
@@ -677,7 +681,7 @@
           <a:p>
             <a:fld id="{0FBF1EB2-CB17-4A79-9466-7C3708736DBA}" type="datetimeFigureOut">
               <a:rPr lang="en-IL" smtClean="0"/>
-              <a:t>11/16/2021</a:t>
+              <a:t>11/20/2021</a:t>
             </a:fld>
             <a:endParaRPr lang="en-IL"/>
           </a:p>
@@ -877,7 +881,7 @@
           <a:p>
             <a:fld id="{0FBF1EB2-CB17-4A79-9466-7C3708736DBA}" type="datetimeFigureOut">
               <a:rPr lang="en-IL" smtClean="0"/>
-              <a:t>11/16/2021</a:t>
+              <a:t>11/20/2021</a:t>
             </a:fld>
             <a:endParaRPr lang="en-IL"/>
           </a:p>
@@ -1153,7 +1157,7 @@
           <a:p>
             <a:fld id="{0FBF1EB2-CB17-4A79-9466-7C3708736DBA}" type="datetimeFigureOut">
               <a:rPr lang="en-IL" smtClean="0"/>
-              <a:t>11/16/2021</a:t>
+              <a:t>11/20/2021</a:t>
             </a:fld>
             <a:endParaRPr lang="en-IL"/>
           </a:p>
@@ -1421,7 +1425,7 @@
           <a:p>
             <a:fld id="{0FBF1EB2-CB17-4A79-9466-7C3708736DBA}" type="datetimeFigureOut">
               <a:rPr lang="en-IL" smtClean="0"/>
-              <a:t>11/16/2021</a:t>
+              <a:t>11/20/2021</a:t>
             </a:fld>
             <a:endParaRPr lang="en-IL"/>
           </a:p>
@@ -1836,7 +1840,7 @@
           <a:p>
             <a:fld id="{0FBF1EB2-CB17-4A79-9466-7C3708736DBA}" type="datetimeFigureOut">
               <a:rPr lang="en-IL" smtClean="0"/>
-              <a:t>11/16/2021</a:t>
+              <a:t>11/20/2021</a:t>
             </a:fld>
             <a:endParaRPr lang="en-IL"/>
           </a:p>
@@ -1978,7 +1982,7 @@
           <a:p>
             <a:fld id="{0FBF1EB2-CB17-4A79-9466-7C3708736DBA}" type="datetimeFigureOut">
               <a:rPr lang="en-IL" smtClean="0"/>
-              <a:t>11/16/2021</a:t>
+              <a:t>11/20/2021</a:t>
             </a:fld>
             <a:endParaRPr lang="en-IL"/>
           </a:p>
@@ -2091,7 +2095,7 @@
           <a:p>
             <a:fld id="{0FBF1EB2-CB17-4A79-9466-7C3708736DBA}" type="datetimeFigureOut">
               <a:rPr lang="en-IL" smtClean="0"/>
-              <a:t>11/16/2021</a:t>
+              <a:t>11/20/2021</a:t>
             </a:fld>
             <a:endParaRPr lang="en-IL"/>
           </a:p>
@@ -2404,7 +2408,7 @@
           <a:p>
             <a:fld id="{0FBF1EB2-CB17-4A79-9466-7C3708736DBA}" type="datetimeFigureOut">
               <a:rPr lang="en-IL" smtClean="0"/>
-              <a:t>11/16/2021</a:t>
+              <a:t>11/20/2021</a:t>
             </a:fld>
             <a:endParaRPr lang="en-IL"/>
           </a:p>
@@ -2693,7 +2697,7 @@
           <a:p>
             <a:fld id="{0FBF1EB2-CB17-4A79-9466-7C3708736DBA}" type="datetimeFigureOut">
               <a:rPr lang="en-IL" smtClean="0"/>
-              <a:t>11/16/2021</a:t>
+              <a:t>11/20/2021</a:t>
             </a:fld>
             <a:endParaRPr lang="en-IL"/>
           </a:p>
@@ -2936,7 +2940,7 @@
           <a:p>
             <a:fld id="{0FBF1EB2-CB17-4A79-9466-7C3708736DBA}" type="datetimeFigureOut">
               <a:rPr lang="en-IL" smtClean="0"/>
-              <a:t>11/16/2021</a:t>
+              <a:t>11/20/2021</a:t>
             </a:fld>
             <a:endParaRPr lang="en-IL"/>
           </a:p>
@@ -3371,8 +3375,8 @@
         </p:nvSpPr>
         <p:spPr>
           <a:xfrm>
-            <a:off x="82193" y="772318"/>
-            <a:ext cx="12109807" cy="1655763"/>
+            <a:off x="0" y="193955"/>
+            <a:ext cx="12192000" cy="1635467"/>
           </a:xfrm>
         </p:spPr>
         <p:txBody>
@@ -3383,10 +3387,14 @@
           <a:p>
             <a:pPr rtl="0"/>
             <a:r>
-              <a:rPr lang="en-US" sz="4400" dirty="0"/>
+              <a:rPr lang="en-US" sz="4200" dirty="0">
+                <a:latin typeface="Bell MT" panose="02020503060305020303" pitchFamily="18" charset="0"/>
+              </a:rPr>
               <a:t>Learning a High-Precision Robotic Assembly Task Using Pose Estimation from Simulated Depth Images</a:t>
             </a:r>
-            <a:endParaRPr lang="en-IL" sz="4400" dirty="0"/>
+            <a:endParaRPr lang="en-IL" sz="4200" dirty="0">
+              <a:latin typeface="Bell MT" panose="02020503060305020303" pitchFamily="18" charset="0"/>
+            </a:endParaRPr>
           </a:p>
         </p:txBody>
       </p:sp>
@@ -3408,16 +3416,19 @@
         </p:nvSpPr>
         <p:spPr>
           <a:xfrm>
-            <a:off x="1739757" y="2774158"/>
-            <a:ext cx="9144000" cy="1655762"/>
+            <a:off x="768928" y="3429000"/>
+            <a:ext cx="7183582" cy="1132538"/>
           </a:xfrm>
         </p:spPr>
         <p:txBody>
-          <a:bodyPr/>
-          <a:lstStyle/>
-          <a:p>
-            <a:r>
-              <a:rPr lang="en-US" b="0" i="0" dirty="0">
+          <a:bodyPr>
+            <a:normAutofit/>
+          </a:bodyPr>
+          <a:lstStyle/>
+          <a:p>
+            <a:pPr rtl="0"/>
+            <a:r>
+              <a:rPr lang="en-US" sz="2000" b="0" i="0" dirty="0">
                 <a:solidFill>
                   <a:srgbClr val="222222"/>
                 </a:solidFill>
@@ -3427,7 +3438,7 @@
               <a:t>Litvak, Y., </a:t>
             </a:r>
             <a:r>
-              <a:rPr lang="en-US" b="0" i="0" dirty="0" err="1">
+              <a:rPr lang="en-US" sz="2000" b="0" i="0" dirty="0" err="1">
                 <a:solidFill>
                   <a:srgbClr val="222222"/>
                 </a:solidFill>
@@ -3437,17 +3448,17 @@
               <a:t>Biess</a:t>
             </a:r>
             <a:r>
-              <a:rPr lang="en-US" b="0" i="0" dirty="0">
+              <a:rPr lang="en-US" sz="2000" b="0" i="0" dirty="0">
                 <a:solidFill>
                   <a:srgbClr val="222222"/>
                 </a:solidFill>
                 <a:effectLst/>
                 <a:latin typeface="Arial" panose="020B0604020202020204" pitchFamily="34" charset="0"/>
               </a:rPr>
-              <a:t>, A., &amp; Bar-Hillel, A. (2019, May</a:t>
-            </a:r>
-            <a:r>
-              <a:rPr lang="en-US" i="1" dirty="0">
+              <a:t>, A., &amp; Bar-Hillel, A., 2019</a:t>
+            </a:r>
+            <a:r>
+              <a:rPr lang="en-US" sz="2000" i="1" dirty="0">
                 <a:solidFill>
                   <a:srgbClr val="222222"/>
                 </a:solidFill>
@@ -3456,26 +3467,26 @@
               <a:t>, </a:t>
             </a:r>
             <a:r>
-              <a:rPr lang="en-US" b="0" i="1" dirty="0">
+              <a:rPr lang="en-US" sz="2000" b="0" i="1" dirty="0">
                 <a:solidFill>
                   <a:srgbClr val="222222"/>
                 </a:solidFill>
                 <a:effectLst/>
                 <a:latin typeface="Arial" panose="020B0604020202020204" pitchFamily="34" charset="0"/>
               </a:rPr>
-              <a:t>ICRA).</a:t>
-            </a:r>
-            <a:r>
-              <a:rPr lang="en-US" b="0" i="0" dirty="0">
+              <a:t>International Conference of Robotics and Automation</a:t>
+            </a:r>
+            <a:r>
+              <a:rPr lang="en-US" sz="2000" b="0" i="0" dirty="0">
                 <a:solidFill>
                   <a:srgbClr val="222222"/>
                 </a:solidFill>
                 <a:effectLst/>
                 <a:latin typeface="Arial" panose="020B0604020202020204" pitchFamily="34" charset="0"/>
               </a:rPr>
-              <a:t> ‏</a:t>
-            </a:r>
-            <a:endParaRPr lang="en-IL" dirty="0"/>
+              <a:t>‏</a:t>
+            </a:r>
+            <a:endParaRPr lang="en-IL" sz="2000" dirty="0"/>
           </a:p>
         </p:txBody>
       </p:sp>
@@ -3493,8 +3504,8 @@
         </p:nvSpPr>
         <p:spPr>
           <a:xfrm>
-            <a:off x="657546" y="4058292"/>
-            <a:ext cx="10736494" cy="707886"/>
+            <a:off x="221673" y="5785394"/>
+            <a:ext cx="10736494" cy="400110"/>
           </a:xfrm>
           <a:prstGeom prst="rect">
             <a:avLst/>
@@ -3509,25 +3520,271 @@
           <a:p>
             <a:pPr algn="l" rtl="0"/>
             <a:r>
-              <a:rPr lang="en-US" sz="4000" dirty="0"/>
-              <a:t>Presented By: Guy </a:t>
-            </a:r>
-            <a:r>
-              <a:rPr lang="en-US" sz="4000" dirty="0" err="1"/>
-              <a:t>Farjon</a:t>
-            </a:r>
-            <a:r>
-              <a:rPr lang="en-US" sz="4000" dirty="0"/>
-              <a:t>, Amit Cohen, Nitzan Levy</a:t>
-            </a:r>
-            <a:endParaRPr lang="en-IL" sz="4000" dirty="0"/>
-          </a:p>
-        </p:txBody>
-      </p:sp>
+              <a:rPr lang="en-US" sz="2000" dirty="0"/>
+              <a:t>Presented by: Guy Farjon, Amit Cohen, Nitzan Levy</a:t>
+            </a:r>
+            <a:endParaRPr lang="en-IL" sz="2000" dirty="0"/>
+          </a:p>
+        </p:txBody>
+      </p:sp>
+      <p:pic>
+        <p:nvPicPr>
+          <p:cNvPr id="5" name="Picture 4">
+            <a:extLst>
+              <a:ext uri="{FF2B5EF4-FFF2-40B4-BE49-F238E27FC236}">
+                <a16:creationId xmlns:a16="http://schemas.microsoft.com/office/drawing/2014/main" id="{92FD4558-72F1-4EDF-B39A-D83A160298DB}"/>
+              </a:ext>
+            </a:extLst>
+          </p:cNvPr>
+          <p:cNvPicPr>
+            <a:picLocks noChangeAspect="1"/>
+          </p:cNvPicPr>
+          <p:nvPr/>
+        </p:nvPicPr>
+        <p:blipFill>
+          <a:blip r:embed="rId2"/>
+          <a:stretch>
+            <a:fillRect/>
+          </a:stretch>
+        </p:blipFill>
+        <p:spPr>
+          <a:xfrm>
+            <a:off x="8832272" y="2337404"/>
+            <a:ext cx="2590800" cy="3848100"/>
+          </a:xfrm>
+          <a:prstGeom prst="rect">
+            <a:avLst/>
+          </a:prstGeom>
+          <a:ln>
+            <a:noFill/>
+          </a:ln>
+          <a:effectLst>
+            <a:softEdge rad="112500"/>
+          </a:effectLst>
+        </p:spPr>
+      </p:pic>
     </p:spTree>
     <p:extLst>
       <p:ext uri="{BB962C8B-B14F-4D97-AF65-F5344CB8AC3E}">
         <p14:creationId xmlns:p14="http://schemas.microsoft.com/office/powerpoint/2010/main" val="1608953089"/>
+      </p:ext>
+    </p:extLst>
+  </p:cSld>
+  <p:clrMapOvr>
+    <a:masterClrMapping/>
+  </p:clrMapOvr>
+</p:sld>
+</file>
+
+<file path=ppt/slides/slide10.xml><?xml version="1.0" encoding="utf-8"?>
+<p:sld xmlns:a="http://schemas.openxmlformats.org/drawingml/2006/main" xmlns:r="http://schemas.openxmlformats.org/officeDocument/2006/relationships" xmlns:p="http://schemas.openxmlformats.org/presentationml/2006/main">
+  <p:cSld>
+    <p:spTree>
+      <p:nvGrpSpPr>
+        <p:cNvPr id="1" name=""/>
+        <p:cNvGrpSpPr/>
+        <p:nvPr/>
+      </p:nvGrpSpPr>
+      <p:grpSpPr>
+        <a:xfrm>
+          <a:off x="0" y="0"/>
+          <a:ext cx="0" cy="0"/>
+          <a:chOff x="0" y="0"/>
+          <a:chExt cx="0" cy="0"/>
+        </a:xfrm>
+      </p:grpSpPr>
+      <p:sp>
+        <p:nvSpPr>
+          <p:cNvPr id="2" name="Title 1">
+            <a:extLst>
+              <a:ext uri="{FF2B5EF4-FFF2-40B4-BE49-F238E27FC236}">
+                <a16:creationId xmlns:a16="http://schemas.microsoft.com/office/drawing/2014/main" id="{A2DFABF9-1F8F-4AFF-8CE3-12ACDCA901EA}"/>
+              </a:ext>
+            </a:extLst>
+          </p:cNvPr>
+          <p:cNvSpPr>
+            <a:spLocks noGrp="1"/>
+          </p:cNvSpPr>
+          <p:nvPr>
+            <p:ph type="title"/>
+          </p:nvPr>
+        </p:nvSpPr>
+        <p:spPr/>
+        <p:txBody>
+          <a:bodyPr/>
+          <a:lstStyle/>
+          <a:p>
+            <a:pPr algn="l" rtl="0"/>
+            <a:r>
+              <a:rPr lang="en-US" dirty="0"/>
+              <a:t>Conclusion</a:t>
+            </a:r>
+          </a:p>
+        </p:txBody>
+      </p:sp>
+      <p:sp>
+        <p:nvSpPr>
+          <p:cNvPr id="3" name="Content Placeholder 2">
+            <a:extLst>
+              <a:ext uri="{FF2B5EF4-FFF2-40B4-BE49-F238E27FC236}">
+                <a16:creationId xmlns:a16="http://schemas.microsoft.com/office/drawing/2014/main" id="{1612A23E-D17C-4E14-B6FC-42D91266DE72}"/>
+              </a:ext>
+            </a:extLst>
+          </p:cNvPr>
+          <p:cNvSpPr>
+            <a:spLocks noGrp="1"/>
+          </p:cNvSpPr>
+          <p:nvPr>
+            <p:ph idx="1"/>
+          </p:nvPr>
+        </p:nvSpPr>
+        <p:spPr/>
+        <p:txBody>
+          <a:bodyPr/>
+          <a:lstStyle/>
+          <a:p>
+            <a:pPr algn="l" rtl="0"/>
+            <a:r>
+              <a:rPr lang="en-US" dirty="0"/>
+              <a:t>An assembly task with given 3D CAD files, an accurate pose estimation algorithm can be trained to achieve high assembly success rates.</a:t>
+            </a:r>
+          </a:p>
+          <a:p>
+            <a:pPr algn="l" rtl="0"/>
+            <a:r>
+              <a:rPr lang="en-US" dirty="0"/>
+              <a:t>The simulation-to-reality gap can be significantly bridged by using depth images and the assembly task can be learned on simulated images only.</a:t>
+            </a:r>
+          </a:p>
+        </p:txBody>
+      </p:sp>
+    </p:spTree>
+    <p:extLst>
+      <p:ext uri="{BB962C8B-B14F-4D97-AF65-F5344CB8AC3E}">
+        <p14:creationId xmlns:p14="http://schemas.microsoft.com/office/powerpoint/2010/main" val="3944448936"/>
+      </p:ext>
+    </p:extLst>
+  </p:cSld>
+  <p:clrMapOvr>
+    <a:masterClrMapping/>
+  </p:clrMapOvr>
+</p:sld>
+</file>
+
+<file path=ppt/slides/slide11.xml><?xml version="1.0" encoding="utf-8"?>
+<p:sld xmlns:a="http://schemas.openxmlformats.org/drawingml/2006/main" xmlns:r="http://schemas.openxmlformats.org/officeDocument/2006/relationships" xmlns:p="http://schemas.openxmlformats.org/presentationml/2006/main">
+  <p:cSld>
+    <p:spTree>
+      <p:nvGrpSpPr>
+        <p:cNvPr id="1" name=""/>
+        <p:cNvGrpSpPr/>
+        <p:nvPr/>
+      </p:nvGrpSpPr>
+      <p:grpSpPr>
+        <a:xfrm>
+          <a:off x="0" y="0"/>
+          <a:ext cx="0" cy="0"/>
+          <a:chOff x="0" y="0"/>
+          <a:chExt cx="0" cy="0"/>
+        </a:xfrm>
+      </p:grpSpPr>
+      <p:sp>
+        <p:nvSpPr>
+          <p:cNvPr id="2" name="כותרת 1">
+            <a:extLst>
+              <a:ext uri="{FF2B5EF4-FFF2-40B4-BE49-F238E27FC236}">
+                <a16:creationId xmlns:a16="http://schemas.microsoft.com/office/drawing/2014/main" id="{9DFB064A-4F4F-40EB-B3E8-54FE4C7C1BCE}"/>
+              </a:ext>
+            </a:extLst>
+          </p:cNvPr>
+          <p:cNvSpPr>
+            <a:spLocks noGrp="1"/>
+          </p:cNvSpPr>
+          <p:nvPr>
+            <p:ph type="title"/>
+          </p:nvPr>
+        </p:nvSpPr>
+        <p:spPr/>
+        <p:txBody>
+          <a:bodyPr>
+            <a:normAutofit/>
+          </a:bodyPr>
+          <a:lstStyle/>
+          <a:p>
+            <a:pPr algn="l" rtl="0"/>
+            <a:r>
+              <a:rPr lang="en-US" b="1" dirty="0"/>
+              <a:t>Our thoughts</a:t>
+            </a:r>
+            <a:endParaRPr lang="en-IL" b="1" dirty="0"/>
+          </a:p>
+        </p:txBody>
+      </p:sp>
+      <p:sp>
+        <p:nvSpPr>
+          <p:cNvPr id="3" name="מציין מיקום תוכן 2">
+            <a:extLst>
+              <a:ext uri="{FF2B5EF4-FFF2-40B4-BE49-F238E27FC236}">
+                <a16:creationId xmlns:a16="http://schemas.microsoft.com/office/drawing/2014/main" id="{DFCD087F-F595-4107-A0D1-8B3A46D67D34}"/>
+              </a:ext>
+            </a:extLst>
+          </p:cNvPr>
+          <p:cNvSpPr>
+            <a:spLocks noGrp="1"/>
+          </p:cNvSpPr>
+          <p:nvPr>
+            <p:ph idx="1"/>
+          </p:nvPr>
+        </p:nvSpPr>
+        <p:spPr/>
+        <p:txBody>
+          <a:bodyPr/>
+          <a:lstStyle/>
+          <a:p>
+            <a:pPr algn="l" rtl="0"/>
+            <a:r>
+              <a:rPr lang="en-US" dirty="0"/>
+              <a:t>Each subproblem was solved independently, which will cause more difficult adaption to new domain related problems.</a:t>
+            </a:r>
+          </a:p>
+          <a:p>
+            <a:pPr algn="l" rtl="0"/>
+            <a:r>
+              <a:rPr lang="en-US" dirty="0"/>
+              <a:t>The solution requires a CAD model – which is rarely accessible to the end user which aims to solve the assembly task.</a:t>
+            </a:r>
+          </a:p>
+          <a:p>
+            <a:pPr algn="l" rtl="0"/>
+            <a:r>
+              <a:rPr lang="en-US" dirty="0"/>
+              <a:t>We would suggest a use of reinforcement learning regarding the grip of the parts.</a:t>
+            </a:r>
+          </a:p>
+          <a:p>
+            <a:pPr algn="l" rtl="0"/>
+            <a:r>
+              <a:rPr lang="en-US" dirty="0"/>
+              <a:t>Expand the use of depth information (e.g., point cloud etc.) in order to avoid the need of CAD models.</a:t>
+            </a:r>
+          </a:p>
+          <a:p>
+            <a:pPr algn="l" rtl="0"/>
+            <a:r>
+              <a:rPr lang="en-US" dirty="0"/>
+              <a:t>No planning algorithms used</a:t>
+            </a:r>
+          </a:p>
+          <a:p>
+            <a:pPr algn="l" rtl="0"/>
+            <a:endParaRPr lang="en-IL" dirty="0"/>
+          </a:p>
+        </p:txBody>
+      </p:sp>
+    </p:spTree>
+    <p:extLst>
+      <p:ext uri="{BB962C8B-B14F-4D97-AF65-F5344CB8AC3E}">
+        <p14:creationId xmlns:p14="http://schemas.microsoft.com/office/powerpoint/2010/main" val="3122920828"/>
       </p:ext>
     </p:extLst>
   </p:cSld>
@@ -3575,12 +3832,12 @@
           <a:bodyPr/>
           <a:lstStyle/>
           <a:p>
-            <a:pPr algn="ctr" rtl="0"/>
-            <a:r>
-              <a:rPr lang="en-US" dirty="0"/>
-              <a:t>Robotic Agenda </a:t>
-            </a:r>
-            <a:endParaRPr lang="en-IL" dirty="0"/>
+            <a:pPr algn="l" rtl="0"/>
+            <a:r>
+              <a:rPr lang="en-US" sz="4200" b="1" dirty="0"/>
+              <a:t>Today’s Talk</a:t>
+            </a:r>
+            <a:endParaRPr lang="en-IL" sz="4200" b="1" dirty="0"/>
           </a:p>
         </p:txBody>
       </p:sp>
@@ -3603,61 +3860,116 @@
         <p:spPr>
           <a:xfrm>
             <a:off x="838200" y="1690688"/>
-            <a:ext cx="10515600" cy="4486275"/>
+            <a:ext cx="11159836" cy="4987203"/>
           </a:xfrm>
         </p:spPr>
         <p:txBody>
           <a:bodyPr>
-            <a:normAutofit/>
+            <a:normAutofit fontScale="70000" lnSpcReduction="20000"/>
           </a:bodyPr>
           <a:lstStyle/>
           <a:p>
-            <a:pPr algn="l" rtl="0"/>
+            <a:pPr algn="l" rtl="0">
+              <a:lnSpc>
+                <a:spcPct val="160000"/>
+              </a:lnSpc>
+            </a:pPr>
             <a:r>
               <a:rPr lang="en-US" sz="3600" dirty="0"/>
-              <a:t>Siemens Innovation Challenge (SIC) – solving a generic assembly task with flexible conditions</a:t>
-            </a:r>
-          </a:p>
-          <a:p>
-            <a:pPr algn="l" rtl="0"/>
+              <a:t>Introducing the </a:t>
+            </a:r>
+            <a:r>
+              <a:rPr lang="en-US" sz="3600" i="1" dirty="0"/>
+              <a:t>Siemens Innovation Challenge</a:t>
+            </a:r>
+          </a:p>
+          <a:p>
+            <a:pPr lvl="1" algn="l" rtl="0">
+              <a:lnSpc>
+                <a:spcPct val="160000"/>
+              </a:lnSpc>
+            </a:pPr>
+            <a:r>
+              <a:rPr lang="en-US" sz="3000" dirty="0"/>
+              <a:t>solving a generic assembly task</a:t>
+            </a:r>
+          </a:p>
+          <a:p>
+            <a:pPr algn="l" rtl="0">
+              <a:lnSpc>
+                <a:spcPct val="120000"/>
+              </a:lnSpc>
+            </a:pPr>
             <a:r>
               <a:rPr lang="en-US" sz="3600" dirty="0"/>
-              <a:t>Overcoming related works constraints</a:t>
-            </a:r>
-          </a:p>
-          <a:p>
-            <a:pPr algn="l" rtl="0"/>
+              <a:t>Why is it hard? </a:t>
+            </a:r>
+            <a:endParaRPr lang="en-US" sz="3200" dirty="0"/>
+          </a:p>
+          <a:p>
+            <a:pPr algn="l" rtl="0">
+              <a:lnSpc>
+                <a:spcPct val="120000"/>
+              </a:lnSpc>
+            </a:pPr>
             <a:r>
               <a:rPr lang="en-US" sz="3600" dirty="0"/>
-              <a:t>Assembly task as a pose estimation problem</a:t>
-            </a:r>
-          </a:p>
-          <a:p>
-            <a:pPr lvl="1" algn="l" rtl="0"/>
-            <a:r>
-              <a:rPr lang="en-US" sz="3200" dirty="0"/>
+              <a:t>Changing perspective – parts assembly as a pose estimation problem</a:t>
+            </a:r>
+          </a:p>
+          <a:p>
+            <a:pPr lvl="1" algn="l" rtl="0">
+              <a:lnSpc>
+                <a:spcPct val="160000"/>
+              </a:lnSpc>
+            </a:pPr>
+            <a:r>
+              <a:rPr lang="en-US" sz="3000" dirty="0"/>
               <a:t>Coarse and refined pose estimation</a:t>
             </a:r>
           </a:p>
           <a:p>
-            <a:pPr lvl="1" algn="l" rtl="0"/>
-            <a:r>
-              <a:rPr lang="en-US" sz="3200" dirty="0"/>
+            <a:pPr lvl="1" algn="l" rtl="0">
+              <a:lnSpc>
+                <a:spcPct val="160000"/>
+              </a:lnSpc>
+            </a:pPr>
+            <a:r>
+              <a:rPr lang="en-US" sz="3000" dirty="0"/>
               <a:t>Bridging the simulation-reality gap</a:t>
             </a:r>
           </a:p>
           <a:p>
-            <a:pPr lvl="1" algn="l" rtl="0"/>
-            <a:r>
-              <a:rPr lang="en-US" sz="3200" dirty="0"/>
-              <a:t>Fusing the components to the final assembly</a:t>
-            </a:r>
-          </a:p>
-          <a:p>
-            <a:pPr algn="l" rtl="0"/>
+            <a:pPr lvl="1" algn="l" rtl="0">
+              <a:lnSpc>
+                <a:spcPct val="160000"/>
+              </a:lnSpc>
+            </a:pPr>
+            <a:r>
+              <a:rPr lang="en-US" sz="3000" dirty="0"/>
+              <a:t>Fusing components for task completion</a:t>
+            </a:r>
+          </a:p>
+          <a:p>
+            <a:pPr algn="l" rtl="0">
+              <a:lnSpc>
+                <a:spcPct val="120000"/>
+              </a:lnSpc>
+            </a:pPr>
             <a:r>
               <a:rPr lang="en-US" sz="3600" dirty="0"/>
-              <a:t>Results</a:t>
+              <a:t>Experiments and Results</a:t>
+            </a:r>
+          </a:p>
+          <a:p>
+            <a:pPr algn="l" rtl="0">
+              <a:lnSpc>
+                <a:spcPct val="120000"/>
+              </a:lnSpc>
+            </a:pPr>
+            <a:r>
+              <a:rPr lang="en-US" sz="3600" dirty="0"/>
+              <a:t>Our thoughts</a:t>
             </a:r>
           </a:p>
           <a:p>
@@ -3719,10 +4031,10 @@
           <a:p>
             <a:pPr algn="l" rtl="0"/>
             <a:r>
-              <a:rPr lang="en-US" dirty="0"/>
-              <a:t>SIC – HW, SW and Components</a:t>
-            </a:r>
-            <a:endParaRPr lang="en-IL" dirty="0"/>
+              <a:rPr lang="en-US" b="1" dirty="0"/>
+              <a:t>The Task</a:t>
+            </a:r>
+            <a:endParaRPr lang="en-IL" b="1" dirty="0"/>
           </a:p>
         </p:txBody>
       </p:sp>
@@ -3744,20 +4056,60 @@
         </p:nvSpPr>
         <p:spPr>
           <a:xfrm>
-            <a:off x="838200" y="1825625"/>
-            <a:ext cx="11182564" cy="4351338"/>
+            <a:off x="838201" y="1510145"/>
+            <a:ext cx="8194964" cy="4982730"/>
           </a:xfrm>
         </p:spPr>
         <p:txBody>
           <a:bodyPr>
-            <a:normAutofit fontScale="92500" lnSpcReduction="10000"/>
+            <a:normAutofit/>
           </a:bodyPr>
           <a:lstStyle/>
           <a:p>
             <a:pPr algn="l" rtl="0"/>
             <a:r>
               <a:rPr lang="en-US" dirty="0"/>
-              <a:t>SIC – A task in which a robot needs to assemble a gear-like                                 mechanism with high precision into an operating system</a:t>
+              <a:t>Assembling of a gear-like mechanism</a:t>
+            </a:r>
+          </a:p>
+          <a:p>
+            <a:pPr lvl="1" algn="l" rtl="0"/>
+            <a:r>
+              <a:rPr lang="en-US" dirty="0"/>
+              <a:t>A base, 3 gears, and 2 shafts</a:t>
+            </a:r>
+          </a:p>
+          <a:p>
+            <a:pPr algn="l" rtl="0"/>
+            <a:r>
+              <a:rPr lang="en-US" dirty="0"/>
+              <a:t>Previous work mainly focused on grasping the objects</a:t>
+            </a:r>
+          </a:p>
+          <a:p>
+            <a:pPr lvl="1" algn="l" rtl="0"/>
+            <a:r>
+              <a:rPr lang="en-US" dirty="0" err="1"/>
+              <a:t>Aaa</a:t>
+            </a:r>
+            <a:endParaRPr lang="en-US" dirty="0"/>
+          </a:p>
+          <a:p>
+            <a:pPr algn="l" rtl="0"/>
+            <a:endParaRPr lang="en-US" dirty="0"/>
+          </a:p>
+          <a:p>
+            <a:pPr algn="l" rtl="0"/>
+            <a:r>
+              <a:rPr lang="en-US" dirty="0"/>
+              <a:t>Up until this experiment, solvers assumed a predefined location of each part. </a:t>
+            </a:r>
+          </a:p>
+          <a:p>
+            <a:pPr algn="l" rtl="0"/>
+            <a:r>
+              <a:rPr lang="en-US" dirty="0"/>
+              <a:t>This experiment now uses perception to eliminate this assumption.</a:t>
             </a:r>
           </a:p>
           <a:p>
@@ -3766,53 +4118,14 @@
             </a:pPr>
             <a:endParaRPr lang="en-US" dirty="0"/>
           </a:p>
-          <a:p>
-            <a:pPr algn="l" rtl="0"/>
-            <a:r>
-              <a:rPr lang="en-US" dirty="0"/>
-              <a:t>The environment contains the KUKA LBR IIWA 14 R820, SAKE ROBOTICS EZGripper and an Intel RealSense D415 depth camera</a:t>
-            </a:r>
-          </a:p>
-          <a:p>
-            <a:pPr algn="l" rtl="0"/>
-            <a:endParaRPr lang="en-US" dirty="0"/>
-          </a:p>
-          <a:p>
-            <a:pPr algn="l" rtl="0"/>
-            <a:r>
-              <a:rPr lang="en-US" dirty="0"/>
-              <a:t>The software which was developed in ROS ecosystem, consists of                          a motion planner named </a:t>
-            </a:r>
-            <a:r>
-              <a:rPr lang="en-US" dirty="0" err="1"/>
-              <a:t>Moveit</a:t>
-            </a:r>
-            <a:r>
-              <a:rPr lang="en-US" dirty="0"/>
-              <a:t>! A pose estimation process using python with TensorFlow, And Gazebo simulation environment.</a:t>
-            </a:r>
-          </a:p>
-          <a:p>
-            <a:pPr algn="l" rtl="0"/>
-            <a:r>
-              <a:rPr lang="en-US" dirty="0"/>
-              <a:t>Up until this experiment, solvers assumed a predefined location of each part. This experiment now uses perception to eliminate this assumption.</a:t>
-            </a:r>
-          </a:p>
-          <a:p>
-            <a:pPr marL="0" indent="0" algn="l" rtl="0">
-              <a:buNone/>
-            </a:pPr>
-            <a:endParaRPr lang="en-US" dirty="0"/>
-          </a:p>
         </p:txBody>
       </p:sp>
       <p:pic>
         <p:nvPicPr>
-          <p:cNvPr id="5" name="Picture 53">
-            <a:extLst>
-              <a:ext uri="{FF2B5EF4-FFF2-40B4-BE49-F238E27FC236}">
-                <a16:creationId xmlns:a16="http://schemas.microsoft.com/office/drawing/2014/main" id="{F2FA3E04-8D56-4572-84C6-9DFDCC8F8418}"/>
+          <p:cNvPr id="6" name="תמונה 5">
+            <a:extLst>
+              <a:ext uri="{FF2B5EF4-FFF2-40B4-BE49-F238E27FC236}">
+                <a16:creationId xmlns:a16="http://schemas.microsoft.com/office/drawing/2014/main" id="{BAA059FB-9D2B-44D9-8811-81A3FD81A56B}"/>
               </a:ext>
             </a:extLst>
           </p:cNvPr>
@@ -3822,94 +4135,154 @@
           <p:nvPr/>
         </p:nvPicPr>
         <p:blipFill>
-          <a:blip r:embed="rId2">
-            <a:extLst>
-              <a:ext uri="{28A0092B-C50C-407E-A947-70E740481C1C}">
-                <a14:useLocalDpi xmlns:a14="http://schemas.microsoft.com/office/drawing/2010/main" val="0"/>
-              </a:ext>
-            </a:extLst>
-          </a:blip>
-          <a:srcRect/>
-          <a:stretch>
-            <a:fillRect/>
-          </a:stretch>
-        </p:blipFill>
-        <p:spPr bwMode="auto">
-          <a:xfrm>
-            <a:off x="10895949" y="1755980"/>
-            <a:ext cx="1045624" cy="1051776"/>
-          </a:xfrm>
-          <a:prstGeom prst="rect">
-            <a:avLst/>
-          </a:prstGeom>
-          <a:noFill/>
-          <a:ln w="6350">
-            <a:noFill/>
-            <a:miter lim="800000"/>
-            <a:headEnd/>
-            <a:tailEnd/>
-          </a:ln>
-        </p:spPr>
-      </p:pic>
-      <p:pic>
-        <p:nvPicPr>
-          <p:cNvPr id="6" name="תמונה 5">
-            <a:extLst>
-              <a:ext uri="{FF2B5EF4-FFF2-40B4-BE49-F238E27FC236}">
-                <a16:creationId xmlns:a16="http://schemas.microsoft.com/office/drawing/2014/main" id="{BAA059FB-9D2B-44D9-8811-81A3FD81A56B}"/>
-              </a:ext>
-            </a:extLst>
-          </p:cNvPr>
-          <p:cNvPicPr>
-            <a:picLocks noChangeAspect="1"/>
-          </p:cNvPicPr>
-          <p:nvPr/>
-        </p:nvPicPr>
-        <p:blipFill>
-          <a:blip r:embed="rId3"/>
+          <a:blip r:embed="rId2"/>
           <a:stretch>
             <a:fillRect/>
           </a:stretch>
         </p:blipFill>
         <p:spPr>
           <a:xfrm>
-            <a:off x="9720403" y="1940497"/>
-            <a:ext cx="1175546" cy="682741"/>
+            <a:off x="9906000" y="860426"/>
+            <a:ext cx="1779658" cy="1033601"/>
           </a:xfrm>
           <a:prstGeom prst="rect">
             <a:avLst/>
           </a:prstGeom>
         </p:spPr>
       </p:pic>
-      <p:pic>
-        <p:nvPicPr>
-          <p:cNvPr id="7" name="תמונה 6">
-            <a:extLst>
-              <a:ext uri="{FF2B5EF4-FFF2-40B4-BE49-F238E27FC236}">
-                <a16:creationId xmlns:a16="http://schemas.microsoft.com/office/drawing/2014/main" id="{C2E61A6C-A443-448A-9C5D-56509B2E02DA}"/>
-              </a:ext>
-            </a:extLst>
-          </p:cNvPr>
-          <p:cNvPicPr>
-            <a:picLocks noChangeAspect="1"/>
-          </p:cNvPicPr>
+      <p:sp>
+        <p:nvSpPr>
+          <p:cNvPr id="4" name="TextBox 3">
+            <a:extLst>
+              <a:ext uri="{FF2B5EF4-FFF2-40B4-BE49-F238E27FC236}">
+                <a16:creationId xmlns:a16="http://schemas.microsoft.com/office/drawing/2014/main" id="{253AB688-9406-46E9-A0A8-5FC3F21EB732}"/>
+              </a:ext>
+            </a:extLst>
+          </p:cNvPr>
+          <p:cNvSpPr txBox="1"/>
           <p:nvPr/>
-        </p:nvPicPr>
-        <p:blipFill rotWithShape="1">
-          <a:blip r:embed="rId4"/>
-          <a:srcRect t="49598" r="75634"/>
-          <a:stretch/>
-        </p:blipFill>
+        </p:nvSpPr>
         <p:spPr>
           <a:xfrm>
-            <a:off x="10835436" y="2922628"/>
-            <a:ext cx="1036728" cy="1508045"/>
+            <a:off x="9351819" y="2389328"/>
+            <a:ext cx="2743200" cy="2308324"/>
           </a:xfrm>
           <a:prstGeom prst="rect">
             <a:avLst/>
           </a:prstGeom>
+          <a:noFill/>
         </p:spPr>
-      </p:pic>
+        <p:txBody>
+          <a:bodyPr wrap="square" rtlCol="1">
+            <a:spAutoFit/>
+          </a:bodyPr>
+          <a:lstStyle/>
+          <a:p>
+            <a:pPr marL="285750" indent="-285750" algn="l" rtl="0">
+              <a:buFont typeface="Wingdings" panose="05000000000000000000" pitchFamily="2" charset="2"/>
+              <a:buChar char="v"/>
+            </a:pPr>
+            <a:r>
+              <a:rPr lang="en-US" sz="1600" dirty="0"/>
+              <a:t>ROS</a:t>
+            </a:r>
+          </a:p>
+          <a:p>
+            <a:pPr marL="285750" indent="-285750" algn="l" rtl="0">
+              <a:buFont typeface="Wingdings" panose="05000000000000000000" pitchFamily="2" charset="2"/>
+              <a:buChar char="v"/>
+            </a:pPr>
+            <a:r>
+              <a:rPr lang="en-US" sz="1600" dirty="0" err="1"/>
+              <a:t>Kuka</a:t>
+            </a:r>
+            <a:r>
+              <a:rPr lang="en-US" sz="1600" dirty="0"/>
+              <a:t> LBR IIWA 14 R820</a:t>
+            </a:r>
+          </a:p>
+          <a:p>
+            <a:pPr marL="285750" indent="-285750" algn="l" rtl="0">
+              <a:buFont typeface="Wingdings" panose="05000000000000000000" pitchFamily="2" charset="2"/>
+              <a:buChar char="v"/>
+            </a:pPr>
+            <a:r>
+              <a:rPr lang="en-US" sz="1600" dirty="0"/>
+              <a:t>SAKE ROBOTICS </a:t>
+            </a:r>
+            <a:r>
+              <a:rPr lang="en-US" sz="1600" dirty="0" err="1"/>
+              <a:t>EZGripper</a:t>
+            </a:r>
+            <a:endParaRPr lang="en-US" sz="1600" dirty="0"/>
+          </a:p>
+          <a:p>
+            <a:pPr marL="285750" indent="-285750" algn="l" rtl="0">
+              <a:buFont typeface="Wingdings" panose="05000000000000000000" pitchFamily="2" charset="2"/>
+              <a:buChar char="v"/>
+            </a:pPr>
+            <a:r>
+              <a:rPr lang="en-US" sz="1600" dirty="0"/>
+              <a:t>Intel RealSense D415</a:t>
+            </a:r>
+          </a:p>
+          <a:p>
+            <a:pPr marL="285750" indent="-285750" algn="l" rtl="0">
+              <a:buFont typeface="Wingdings" panose="05000000000000000000" pitchFamily="2" charset="2"/>
+              <a:buChar char="v"/>
+            </a:pPr>
+            <a:r>
+              <a:rPr lang="en-US" sz="1600" dirty="0" err="1"/>
+              <a:t>SunRise</a:t>
+            </a:r>
+            <a:endParaRPr lang="en-US" sz="1600" dirty="0"/>
+          </a:p>
+          <a:p>
+            <a:pPr marL="285750" indent="-285750" algn="l" rtl="0">
+              <a:buFont typeface="Wingdings" panose="05000000000000000000" pitchFamily="2" charset="2"/>
+              <a:buChar char="v"/>
+            </a:pPr>
+            <a:r>
+              <a:rPr lang="en-US" sz="1600" dirty="0"/>
+              <a:t>Gazebo</a:t>
+            </a:r>
+          </a:p>
+          <a:p>
+            <a:pPr marL="285750" indent="-285750" algn="l" rtl="0">
+              <a:buFont typeface="Wingdings" panose="05000000000000000000" pitchFamily="2" charset="2"/>
+              <a:buChar char="v"/>
+            </a:pPr>
+            <a:r>
+              <a:rPr lang="en-US" sz="1600" dirty="0" err="1"/>
+              <a:t>Moveit</a:t>
+            </a:r>
+            <a:r>
+              <a:rPr lang="en-US" sz="1600" dirty="0"/>
+              <a:t>!</a:t>
+            </a:r>
+          </a:p>
+          <a:p>
+            <a:pPr marL="285750" indent="-285750" algn="l" rtl="0">
+              <a:buFont typeface="Wingdings" panose="05000000000000000000" pitchFamily="2" charset="2"/>
+              <a:buChar char="v"/>
+            </a:pPr>
+            <a:r>
+              <a:rPr lang="en-US" sz="1600" dirty="0"/>
+              <a:t>Python (TensorFlow)</a:t>
+            </a:r>
+          </a:p>
+          <a:p>
+            <a:pPr marL="285750" indent="-285750" algn="l" rtl="0">
+              <a:buFont typeface="Wingdings" panose="05000000000000000000" pitchFamily="2" charset="2"/>
+              <a:buChar char="v"/>
+            </a:pPr>
+            <a:r>
+              <a:rPr lang="en-US" sz="1600" dirty="0"/>
+              <a:t>OpenCV</a:t>
+            </a:r>
+          </a:p>
+        </p:txBody>
+      </p:sp>
     </p:spTree>
     <p:extLst>
       <p:ext uri="{BB962C8B-B14F-4D97-AF65-F5344CB8AC3E}">
@@ -3963,58 +4336,324 @@
           <a:p>
             <a:pPr algn="l" rtl="0"/>
             <a:r>
+              <a:rPr lang="en-US" b="1" dirty="0"/>
+              <a:t>Method</a:t>
+            </a:r>
+          </a:p>
+        </p:txBody>
+      </p:sp>
+      <p:sp>
+        <p:nvSpPr>
+          <p:cNvPr id="4" name="TextBox 3">
+            <a:extLst>
+              <a:ext uri="{FF2B5EF4-FFF2-40B4-BE49-F238E27FC236}">
+                <a16:creationId xmlns:a16="http://schemas.microsoft.com/office/drawing/2014/main" id="{B1ED8B72-D03D-4B69-916D-BE3A9632DBBB}"/>
+              </a:ext>
+            </a:extLst>
+          </p:cNvPr>
+          <p:cNvSpPr txBox="1"/>
+          <p:nvPr/>
+        </p:nvSpPr>
+        <p:spPr>
+          <a:xfrm>
+            <a:off x="0" y="6492875"/>
+            <a:ext cx="9694898" cy="369332"/>
+          </a:xfrm>
+          <a:prstGeom prst="rect">
+            <a:avLst/>
+          </a:prstGeom>
+          <a:noFill/>
+        </p:spPr>
+        <p:txBody>
+          <a:bodyPr wrap="none" rtlCol="1">
+            <a:spAutoFit/>
+          </a:bodyPr>
+          <a:lstStyle/>
+          <a:p>
+            <a:pPr algn="l" rtl="0"/>
+            <a:r>
               <a:rPr lang="en-US" dirty="0"/>
-              <a:t>Method</a:t>
-            </a:r>
-          </a:p>
-        </p:txBody>
-      </p:sp>
-      <p:sp>
-        <p:nvSpPr>
-          <p:cNvPr id="3" name="Content Placeholder 2">
-            <a:extLst>
-              <a:ext uri="{FF2B5EF4-FFF2-40B4-BE49-F238E27FC236}">
-                <a16:creationId xmlns:a16="http://schemas.microsoft.com/office/drawing/2014/main" id="{7006DD66-4050-4406-8766-6D3E3F1C1E50}"/>
-              </a:ext>
-            </a:extLst>
-          </p:cNvPr>
-          <p:cNvSpPr>
-            <a:spLocks noGrp="1"/>
-          </p:cNvSpPr>
-          <p:nvPr>
-            <p:ph idx="1"/>
-          </p:nvPr>
-        </p:nvSpPr>
-        <p:spPr/>
-        <p:txBody>
-          <a:bodyPr/>
-          <a:lstStyle/>
-          <a:p>
-            <a:pPr algn="l" rtl="0"/>
+              <a:t>1. Lin, T. Y., Goyal, P., </a:t>
+            </a:r>
+            <a:r>
+              <a:rPr lang="en-US" dirty="0" err="1"/>
+              <a:t>Girshick</a:t>
+            </a:r>
             <a:r>
               <a:rPr lang="en-US" dirty="0"/>
-              <a:t>Creating synthetic depth images in simulation</a:t>
-            </a:r>
-          </a:p>
-          <a:p>
-            <a:pPr algn="l" rtl="0"/>
+              <a:t>, R., He, K., &amp; </a:t>
+            </a:r>
+            <a:r>
+              <a:rPr lang="en-US" dirty="0" err="1"/>
+              <a:t>Dollár</a:t>
+            </a:r>
             <a:r>
               <a:rPr lang="en-US" dirty="0"/>
-              <a:t>Training a pose estimation pipeline based on deep convolutional neural networks</a:t>
-            </a:r>
-          </a:p>
-          <a:p>
-            <a:pPr algn="l" rtl="0"/>
+              <a:t>, P. (2017). Focal loss for dense object detection. </a:t>
+            </a:r>
+            <a:r>
+              <a:rPr lang="en-US" i="1" dirty="0"/>
+              <a:t>ICCV</a:t>
+            </a:r>
             <a:r>
               <a:rPr lang="en-US" dirty="0"/>
-              <a:t>Estimating the parts’ poses in reality, using a camera mounted near the robot’s end-effector</a:t>
-            </a:r>
-          </a:p>
-          <a:p>
-            <a:pPr algn="l" rtl="0"/>
+              <a:t>‏</a:t>
+            </a:r>
+            <a:endParaRPr lang="he-IL" dirty="0"/>
+          </a:p>
+        </p:txBody>
+      </p:sp>
+      <p:pic>
+        <p:nvPicPr>
+          <p:cNvPr id="19" name="Picture 18">
+            <a:extLst>
+              <a:ext uri="{FF2B5EF4-FFF2-40B4-BE49-F238E27FC236}">
+                <a16:creationId xmlns:a16="http://schemas.microsoft.com/office/drawing/2014/main" id="{9BBDC59B-1774-45E4-B843-0B1EDDCEFE51}"/>
+              </a:ext>
+            </a:extLst>
+          </p:cNvPr>
+          <p:cNvPicPr>
+            <a:picLocks noChangeAspect="1"/>
+          </p:cNvPicPr>
+          <p:nvPr/>
+        </p:nvPicPr>
+        <p:blipFill>
+          <a:blip r:embed="rId2"/>
+          <a:stretch>
+            <a:fillRect/>
+          </a:stretch>
+        </p:blipFill>
+        <p:spPr>
+          <a:xfrm>
+            <a:off x="2168236" y="3546778"/>
+            <a:ext cx="7855527" cy="2644905"/>
+          </a:xfrm>
+          <a:prstGeom prst="rect">
+            <a:avLst/>
+          </a:prstGeom>
+        </p:spPr>
+      </p:pic>
+      <p:sp>
+        <p:nvSpPr>
+          <p:cNvPr id="23" name="Content Placeholder 2">
+            <a:extLst>
+              <a:ext uri="{FF2B5EF4-FFF2-40B4-BE49-F238E27FC236}">
+                <a16:creationId xmlns:a16="http://schemas.microsoft.com/office/drawing/2014/main" id="{EF7C005F-DA96-45E7-873A-AE1547E702D6}"/>
+              </a:ext>
+            </a:extLst>
+          </p:cNvPr>
+          <p:cNvSpPr txBox="1">
+            <a:spLocks/>
+          </p:cNvSpPr>
+          <p:nvPr/>
+        </p:nvSpPr>
+        <p:spPr>
+          <a:xfrm>
+            <a:off x="838200" y="1427018"/>
+            <a:ext cx="10515600" cy="5065857"/>
+          </a:xfrm>
+          <a:prstGeom prst="rect">
+            <a:avLst/>
+          </a:prstGeom>
+        </p:spPr>
+        <p:txBody>
+          <a:bodyPr vert="horz" lIns="91440" tIns="45720" rIns="91440" bIns="45720" rtlCol="1">
+            <a:normAutofit/>
+          </a:bodyPr>
+          <a:lstStyle>
+            <a:lvl1pPr marL="228600" indent="-228600" algn="r" defTabSz="914400" rtl="1" eaLnBrk="1" latinLnBrk="0" hangingPunct="1">
+              <a:lnSpc>
+                <a:spcPct val="90000"/>
+              </a:lnSpc>
+              <a:spcBef>
+                <a:spcPts val="1000"/>
+              </a:spcBef>
+              <a:buFont typeface="Arial" panose="020B0604020202020204" pitchFamily="34" charset="0"/>
+              <a:buChar char="•"/>
+              <a:defRPr sz="2800" kern="1200">
+                <a:solidFill>
+                  <a:schemeClr val="tx1"/>
+                </a:solidFill>
+                <a:latin typeface="+mn-lt"/>
+                <a:ea typeface="+mn-ea"/>
+                <a:cs typeface="+mn-cs"/>
+              </a:defRPr>
+            </a:lvl1pPr>
+            <a:lvl2pPr marL="685800" indent="-228600" algn="r" defTabSz="914400" rtl="1" eaLnBrk="1" latinLnBrk="0" hangingPunct="1">
+              <a:lnSpc>
+                <a:spcPct val="90000"/>
+              </a:lnSpc>
+              <a:spcBef>
+                <a:spcPts val="500"/>
+              </a:spcBef>
+              <a:buFont typeface="Arial" panose="020B0604020202020204" pitchFamily="34" charset="0"/>
+              <a:buChar char="•"/>
+              <a:defRPr sz="2400" kern="1200">
+                <a:solidFill>
+                  <a:schemeClr val="tx1"/>
+                </a:solidFill>
+                <a:latin typeface="+mn-lt"/>
+                <a:ea typeface="+mn-ea"/>
+                <a:cs typeface="+mn-cs"/>
+              </a:defRPr>
+            </a:lvl2pPr>
+            <a:lvl3pPr marL="1143000" indent="-228600" algn="r" defTabSz="914400" rtl="1" eaLnBrk="1" latinLnBrk="0" hangingPunct="1">
+              <a:lnSpc>
+                <a:spcPct val="90000"/>
+              </a:lnSpc>
+              <a:spcBef>
+                <a:spcPts val="500"/>
+              </a:spcBef>
+              <a:buFont typeface="Arial" panose="020B0604020202020204" pitchFamily="34" charset="0"/>
+              <a:buChar char="•"/>
+              <a:defRPr sz="2000" kern="1200">
+                <a:solidFill>
+                  <a:schemeClr val="tx1"/>
+                </a:solidFill>
+                <a:latin typeface="+mn-lt"/>
+                <a:ea typeface="+mn-ea"/>
+                <a:cs typeface="+mn-cs"/>
+              </a:defRPr>
+            </a:lvl3pPr>
+            <a:lvl4pPr marL="1600200" indent="-228600" algn="r" defTabSz="914400" rtl="1" eaLnBrk="1" latinLnBrk="0" hangingPunct="1">
+              <a:lnSpc>
+                <a:spcPct val="90000"/>
+              </a:lnSpc>
+              <a:spcBef>
+                <a:spcPts val="500"/>
+              </a:spcBef>
+              <a:buFont typeface="Arial" panose="020B0604020202020204" pitchFamily="34" charset="0"/>
+              <a:buChar char="•"/>
+              <a:defRPr sz="1800" kern="1200">
+                <a:solidFill>
+                  <a:schemeClr val="tx1"/>
+                </a:solidFill>
+                <a:latin typeface="+mn-lt"/>
+                <a:ea typeface="+mn-ea"/>
+                <a:cs typeface="+mn-cs"/>
+              </a:defRPr>
+            </a:lvl4pPr>
+            <a:lvl5pPr marL="2057400" indent="-228600" algn="r" defTabSz="914400" rtl="1" eaLnBrk="1" latinLnBrk="0" hangingPunct="1">
+              <a:lnSpc>
+                <a:spcPct val="90000"/>
+              </a:lnSpc>
+              <a:spcBef>
+                <a:spcPts val="500"/>
+              </a:spcBef>
+              <a:buFont typeface="Arial" panose="020B0604020202020204" pitchFamily="34" charset="0"/>
+              <a:buChar char="•"/>
+              <a:defRPr sz="1800" kern="1200">
+                <a:solidFill>
+                  <a:schemeClr val="tx1"/>
+                </a:solidFill>
+                <a:latin typeface="+mn-lt"/>
+                <a:ea typeface="+mn-ea"/>
+                <a:cs typeface="+mn-cs"/>
+              </a:defRPr>
+            </a:lvl5pPr>
+            <a:lvl6pPr marL="2514600" indent="-228600" algn="r" defTabSz="914400" rtl="1" eaLnBrk="1" latinLnBrk="0" hangingPunct="1">
+              <a:lnSpc>
+                <a:spcPct val="90000"/>
+              </a:lnSpc>
+              <a:spcBef>
+                <a:spcPts val="500"/>
+              </a:spcBef>
+              <a:buFont typeface="Arial" panose="020B0604020202020204" pitchFamily="34" charset="0"/>
+              <a:buChar char="•"/>
+              <a:defRPr sz="1800" kern="1200">
+                <a:solidFill>
+                  <a:schemeClr val="tx1"/>
+                </a:solidFill>
+                <a:latin typeface="+mn-lt"/>
+                <a:ea typeface="+mn-ea"/>
+                <a:cs typeface="+mn-cs"/>
+              </a:defRPr>
+            </a:lvl6pPr>
+            <a:lvl7pPr marL="2971800" indent="-228600" algn="r" defTabSz="914400" rtl="1" eaLnBrk="1" latinLnBrk="0" hangingPunct="1">
+              <a:lnSpc>
+                <a:spcPct val="90000"/>
+              </a:lnSpc>
+              <a:spcBef>
+                <a:spcPts val="500"/>
+              </a:spcBef>
+              <a:buFont typeface="Arial" panose="020B0604020202020204" pitchFamily="34" charset="0"/>
+              <a:buChar char="•"/>
+              <a:defRPr sz="1800" kern="1200">
+                <a:solidFill>
+                  <a:schemeClr val="tx1"/>
+                </a:solidFill>
+                <a:latin typeface="+mn-lt"/>
+                <a:ea typeface="+mn-ea"/>
+                <a:cs typeface="+mn-cs"/>
+              </a:defRPr>
+            </a:lvl7pPr>
+            <a:lvl8pPr marL="3429000" indent="-228600" algn="r" defTabSz="914400" rtl="1" eaLnBrk="1" latinLnBrk="0" hangingPunct="1">
+              <a:lnSpc>
+                <a:spcPct val="90000"/>
+              </a:lnSpc>
+              <a:spcBef>
+                <a:spcPts val="500"/>
+              </a:spcBef>
+              <a:buFont typeface="Arial" panose="020B0604020202020204" pitchFamily="34" charset="0"/>
+              <a:buChar char="•"/>
+              <a:defRPr sz="1800" kern="1200">
+                <a:solidFill>
+                  <a:schemeClr val="tx1"/>
+                </a:solidFill>
+                <a:latin typeface="+mn-lt"/>
+                <a:ea typeface="+mn-ea"/>
+                <a:cs typeface="+mn-cs"/>
+              </a:defRPr>
+            </a:lvl8pPr>
+            <a:lvl9pPr marL="3886200" indent="-228600" algn="r" defTabSz="914400" rtl="1" eaLnBrk="1" latinLnBrk="0" hangingPunct="1">
+              <a:lnSpc>
+                <a:spcPct val="90000"/>
+              </a:lnSpc>
+              <a:spcBef>
+                <a:spcPts val="500"/>
+              </a:spcBef>
+              <a:buFont typeface="Arial" panose="020B0604020202020204" pitchFamily="34" charset="0"/>
+              <a:buChar char="•"/>
+              <a:defRPr sz="1800" kern="1200">
+                <a:solidFill>
+                  <a:schemeClr val="tx1"/>
+                </a:solidFill>
+                <a:latin typeface="+mn-lt"/>
+                <a:ea typeface="+mn-ea"/>
+                <a:cs typeface="+mn-cs"/>
+              </a:defRPr>
+            </a:lvl9pPr>
+          </a:lstStyle>
+          <a:p>
+            <a:pPr marL="514350" indent="-514350" algn="l" rtl="0">
+              <a:buFont typeface="+mj-lt"/>
+              <a:buAutoNum type="arabicPeriod"/>
+            </a:pPr>
             <a:r>
               <a:rPr lang="en-US" dirty="0"/>
-              <a:t>Calculating pick-and-place motions based on the estimated poses</a:t>
+              <a:t>Simulate the environment </a:t>
+            </a:r>
+          </a:p>
+          <a:p>
+            <a:pPr lvl="1" algn="l" rtl="0"/>
+            <a:r>
+              <a:rPr lang="en-US" dirty="0"/>
+              <a:t>Create a huge datasets in seconds</a:t>
+            </a:r>
+          </a:p>
+          <a:p>
+            <a:pPr lvl="1" algn="l" rtl="0"/>
+            <a:r>
+              <a:rPr lang="en-US" dirty="0"/>
+              <a:t>Train a pose estimation pipe on synthetic images (based on RetinaNet</a:t>
+            </a:r>
+            <a:r>
+              <a:rPr lang="en-US" baseline="30000" dirty="0"/>
+              <a:t>1</a:t>
+            </a:r>
+            <a:r>
+              <a:rPr lang="en-US" dirty="0"/>
+              <a:t>)</a:t>
             </a:r>
           </a:p>
         </p:txBody>
@@ -4054,7 +4693,7 @@
           <p:cNvPr id="2" name="Title 1">
             <a:extLst>
               <a:ext uri="{FF2B5EF4-FFF2-40B4-BE49-F238E27FC236}">
-                <a16:creationId xmlns:a16="http://schemas.microsoft.com/office/drawing/2014/main" id="{EEB95EF7-877B-4D2C-AEDF-1BBFC0140AC4}"/>
+                <a16:creationId xmlns:a16="http://schemas.microsoft.com/office/drawing/2014/main" id="{2512CD09-D57B-468C-A382-371B2A4F90C1}"/>
               </a:ext>
             </a:extLst>
           </p:cNvPr>
@@ -4072,92 +4711,678 @@
           <a:p>
             <a:pPr algn="l" rtl="0"/>
             <a:r>
+              <a:rPr lang="en-US" b="1" dirty="0"/>
+              <a:t>Method</a:t>
+            </a:r>
+          </a:p>
+        </p:txBody>
+      </p:sp>
+      <p:sp>
+        <p:nvSpPr>
+          <p:cNvPr id="4" name="TextBox 3">
+            <a:extLst>
+              <a:ext uri="{FF2B5EF4-FFF2-40B4-BE49-F238E27FC236}">
+                <a16:creationId xmlns:a16="http://schemas.microsoft.com/office/drawing/2014/main" id="{B1ED8B72-D03D-4B69-916D-BE3A9632DBBB}"/>
+              </a:ext>
+            </a:extLst>
+          </p:cNvPr>
+          <p:cNvSpPr txBox="1"/>
+          <p:nvPr/>
+        </p:nvSpPr>
+        <p:spPr>
+          <a:xfrm>
+            <a:off x="0" y="6492875"/>
+            <a:ext cx="9694898" cy="369332"/>
+          </a:xfrm>
+          <a:prstGeom prst="rect">
+            <a:avLst/>
+          </a:prstGeom>
+          <a:noFill/>
+        </p:spPr>
+        <p:txBody>
+          <a:bodyPr wrap="none" rtlCol="1">
+            <a:spAutoFit/>
+          </a:bodyPr>
+          <a:lstStyle/>
+          <a:p>
+            <a:pPr algn="l" rtl="0"/>
+            <a:r>
               <a:rPr lang="en-US" dirty="0"/>
-              <a:t>Results</a:t>
-            </a:r>
-          </a:p>
-        </p:txBody>
-      </p:sp>
-      <p:sp>
-        <p:nvSpPr>
-          <p:cNvPr id="3" name="Content Placeholder 2">
-            <a:extLst>
-              <a:ext uri="{FF2B5EF4-FFF2-40B4-BE49-F238E27FC236}">
-                <a16:creationId xmlns:a16="http://schemas.microsoft.com/office/drawing/2014/main" id="{1DC9551D-272A-4156-9093-FDD778B14C0E}"/>
-              </a:ext>
-            </a:extLst>
-          </p:cNvPr>
-          <p:cNvSpPr>
-            <a:spLocks noGrp="1"/>
-          </p:cNvSpPr>
-          <p:nvPr>
-            <p:ph idx="1"/>
-          </p:nvPr>
-        </p:nvSpPr>
-        <p:spPr/>
-        <p:txBody>
-          <a:bodyPr>
-            <a:normAutofit lnSpcReduction="10000"/>
+              <a:t>1. Lin, T. Y., Goyal, P., </a:t>
+            </a:r>
+            <a:r>
+              <a:rPr lang="en-US" dirty="0" err="1"/>
+              <a:t>Girshick</a:t>
+            </a:r>
+            <a:r>
+              <a:rPr lang="en-US" dirty="0"/>
+              <a:t>, R., He, K., &amp; </a:t>
+            </a:r>
+            <a:r>
+              <a:rPr lang="en-US" dirty="0" err="1"/>
+              <a:t>Dollár</a:t>
+            </a:r>
+            <a:r>
+              <a:rPr lang="en-US" dirty="0"/>
+              <a:t>, P. (2017). Focal loss for dense object detection. </a:t>
+            </a:r>
+            <a:r>
+              <a:rPr lang="en-US" i="1" dirty="0"/>
+              <a:t>ICCV</a:t>
+            </a:r>
+            <a:r>
+              <a:rPr lang="en-US" dirty="0"/>
+              <a:t>‏</a:t>
+            </a:r>
+            <a:endParaRPr lang="he-IL" dirty="0"/>
+          </a:p>
+        </p:txBody>
+      </p:sp>
+      <p:pic>
+        <p:nvPicPr>
+          <p:cNvPr id="6" name="Picture 5">
+            <a:extLst>
+              <a:ext uri="{FF2B5EF4-FFF2-40B4-BE49-F238E27FC236}">
+                <a16:creationId xmlns:a16="http://schemas.microsoft.com/office/drawing/2014/main" id="{1290F256-3E92-4764-8030-C480DE2EFEDF}"/>
+              </a:ext>
+            </a:extLst>
+          </p:cNvPr>
+          <p:cNvPicPr>
+            <a:picLocks noChangeAspect="1"/>
+          </p:cNvPicPr>
+          <p:nvPr/>
+        </p:nvPicPr>
+        <p:blipFill>
+          <a:blip r:embed="rId2"/>
+          <a:stretch>
+            <a:fillRect/>
+          </a:stretch>
+        </p:blipFill>
+        <p:spPr>
+          <a:xfrm>
+            <a:off x="8359664" y="3946352"/>
+            <a:ext cx="1590665" cy="1130555"/>
+          </a:xfrm>
+          <a:prstGeom prst="rect">
+            <a:avLst/>
+          </a:prstGeom>
+        </p:spPr>
+      </p:pic>
+      <p:pic>
+        <p:nvPicPr>
+          <p:cNvPr id="7" name="Picture 6">
+            <a:extLst>
+              <a:ext uri="{FF2B5EF4-FFF2-40B4-BE49-F238E27FC236}">
+                <a16:creationId xmlns:a16="http://schemas.microsoft.com/office/drawing/2014/main" id="{B9AC6902-4B60-4464-ADC7-7FFDFD6DFF61}"/>
+              </a:ext>
+            </a:extLst>
+          </p:cNvPr>
+          <p:cNvPicPr>
+            <a:picLocks noChangeAspect="1"/>
+          </p:cNvPicPr>
+          <p:nvPr/>
+        </p:nvPicPr>
+        <p:blipFill>
+          <a:blip r:embed="rId3"/>
+          <a:stretch>
+            <a:fillRect/>
+          </a:stretch>
+        </p:blipFill>
+        <p:spPr>
+          <a:xfrm>
+            <a:off x="10171069" y="3946352"/>
+            <a:ext cx="1590665" cy="1130555"/>
+          </a:xfrm>
+          <a:prstGeom prst="rect">
+            <a:avLst/>
+          </a:prstGeom>
+        </p:spPr>
+      </p:pic>
+      <p:pic>
+        <p:nvPicPr>
+          <p:cNvPr id="8" name="Picture 7">
+            <a:extLst>
+              <a:ext uri="{FF2B5EF4-FFF2-40B4-BE49-F238E27FC236}">
+                <a16:creationId xmlns:a16="http://schemas.microsoft.com/office/drawing/2014/main" id="{AD117E8D-B99D-4AB6-A95F-70AA8AAC705A}"/>
+              </a:ext>
+            </a:extLst>
+          </p:cNvPr>
+          <p:cNvPicPr>
+            <a:picLocks noChangeAspect="1"/>
+          </p:cNvPicPr>
+          <p:nvPr/>
+        </p:nvPicPr>
+        <p:blipFill>
+          <a:blip r:embed="rId4"/>
+          <a:stretch>
+            <a:fillRect/>
+          </a:stretch>
+        </p:blipFill>
+        <p:spPr>
+          <a:xfrm>
+            <a:off x="8359664" y="5257977"/>
+            <a:ext cx="1590665" cy="1077971"/>
+          </a:xfrm>
+          <a:prstGeom prst="rect">
+            <a:avLst/>
+          </a:prstGeom>
+        </p:spPr>
+      </p:pic>
+      <p:pic>
+        <p:nvPicPr>
+          <p:cNvPr id="9" name="Picture 8">
+            <a:extLst>
+              <a:ext uri="{FF2B5EF4-FFF2-40B4-BE49-F238E27FC236}">
+                <a16:creationId xmlns:a16="http://schemas.microsoft.com/office/drawing/2014/main" id="{3E5F5A63-7815-453D-8DA1-5BB17BE85243}"/>
+              </a:ext>
+            </a:extLst>
+          </p:cNvPr>
+          <p:cNvPicPr>
+            <a:picLocks noChangeAspect="1"/>
+          </p:cNvPicPr>
+          <p:nvPr/>
+        </p:nvPicPr>
+        <p:blipFill>
+          <a:blip r:embed="rId5"/>
+          <a:stretch>
+            <a:fillRect/>
+          </a:stretch>
+        </p:blipFill>
+        <p:spPr>
+          <a:xfrm>
+            <a:off x="10171069" y="5257977"/>
+            <a:ext cx="1590665" cy="1077971"/>
+          </a:xfrm>
+          <a:prstGeom prst="rect">
+            <a:avLst/>
+          </a:prstGeom>
+        </p:spPr>
+      </p:pic>
+      <p:sp>
+        <p:nvSpPr>
+          <p:cNvPr id="10" name="TextBox 9">
+            <a:extLst>
+              <a:ext uri="{FF2B5EF4-FFF2-40B4-BE49-F238E27FC236}">
+                <a16:creationId xmlns:a16="http://schemas.microsoft.com/office/drawing/2014/main" id="{7546B7CE-A102-4A6E-8B47-B607E04C4191}"/>
+              </a:ext>
+            </a:extLst>
+          </p:cNvPr>
+          <p:cNvSpPr txBox="1"/>
+          <p:nvPr/>
+        </p:nvSpPr>
+        <p:spPr>
+          <a:xfrm>
+            <a:off x="8755046" y="3509552"/>
+            <a:ext cx="799899" cy="369332"/>
+          </a:xfrm>
+          <a:prstGeom prst="rect">
+            <a:avLst/>
+          </a:prstGeom>
+          <a:noFill/>
+        </p:spPr>
+        <p:txBody>
+          <a:bodyPr wrap="none" rtlCol="1">
+            <a:spAutoFit/>
           </a:bodyPr>
           <a:lstStyle/>
           <a:p>
             <a:pPr algn="l" rtl="0"/>
             <a:r>
               <a:rPr lang="en-US" dirty="0"/>
-              <a:t>Total of 30 experiments.</a:t>
-            </a:r>
-          </a:p>
+              <a:t>before</a:t>
+            </a:r>
+            <a:endParaRPr lang="he-IL" dirty="0"/>
+          </a:p>
+        </p:txBody>
+      </p:sp>
+      <p:sp>
+        <p:nvSpPr>
+          <p:cNvPr id="11" name="TextBox 10">
+            <a:extLst>
+              <a:ext uri="{FF2B5EF4-FFF2-40B4-BE49-F238E27FC236}">
+                <a16:creationId xmlns:a16="http://schemas.microsoft.com/office/drawing/2014/main" id="{B8A6D202-E1FB-4F8B-B943-8935A791AA3D}"/>
+              </a:ext>
+            </a:extLst>
+          </p:cNvPr>
+          <p:cNvSpPr txBox="1"/>
+          <p:nvPr/>
+        </p:nvSpPr>
+        <p:spPr>
+          <a:xfrm>
+            <a:off x="10649166" y="3509552"/>
+            <a:ext cx="634469" cy="369332"/>
+          </a:xfrm>
+          <a:prstGeom prst="rect">
+            <a:avLst/>
+          </a:prstGeom>
+          <a:noFill/>
+        </p:spPr>
+        <p:txBody>
+          <a:bodyPr wrap="none" rtlCol="1">
+            <a:spAutoFit/>
+          </a:bodyPr>
+          <a:lstStyle/>
           <a:p>
             <a:pPr algn="l" rtl="0"/>
             <a:r>
               <a:rPr lang="en-US" dirty="0"/>
-              <a:t>Pose estimation resulted in an average translational accuracy of 2.14mm and a rotational accuracy of 1.09 degrees.</a:t>
-            </a:r>
-          </a:p>
-          <a:p>
-            <a:pPr algn="l" rtl="0"/>
+              <a:t>after</a:t>
+            </a:r>
+            <a:endParaRPr lang="he-IL" dirty="0"/>
+          </a:p>
+        </p:txBody>
+      </p:sp>
+      <p:sp>
+        <p:nvSpPr>
+          <p:cNvPr id="15" name="Content Placeholder 2">
+            <a:extLst>
+              <a:ext uri="{FF2B5EF4-FFF2-40B4-BE49-F238E27FC236}">
+                <a16:creationId xmlns:a16="http://schemas.microsoft.com/office/drawing/2014/main" id="{146333A9-FF15-42E7-AEAD-D78DCFE3B550}"/>
+              </a:ext>
+            </a:extLst>
+          </p:cNvPr>
+          <p:cNvSpPr txBox="1">
+            <a:spLocks/>
+          </p:cNvSpPr>
+          <p:nvPr/>
+        </p:nvSpPr>
+        <p:spPr>
+          <a:xfrm>
+            <a:off x="838200" y="1427018"/>
+            <a:ext cx="10515600" cy="5065857"/>
+          </a:xfrm>
+          <a:prstGeom prst="rect">
+            <a:avLst/>
+          </a:prstGeom>
+        </p:spPr>
+        <p:txBody>
+          <a:bodyPr vert="horz" lIns="91440" tIns="45720" rIns="91440" bIns="45720" rtlCol="1">
+            <a:normAutofit/>
+          </a:bodyPr>
+          <a:lstStyle>
+            <a:lvl1pPr marL="228600" indent="-228600" algn="r" defTabSz="914400" rtl="1" eaLnBrk="1" latinLnBrk="0" hangingPunct="1">
+              <a:lnSpc>
+                <a:spcPct val="90000"/>
+              </a:lnSpc>
+              <a:spcBef>
+                <a:spcPts val="1000"/>
+              </a:spcBef>
+              <a:buFont typeface="Arial" panose="020B0604020202020204" pitchFamily="34" charset="0"/>
+              <a:buChar char="•"/>
+              <a:defRPr sz="2800" kern="1200">
+                <a:solidFill>
+                  <a:schemeClr val="tx1"/>
+                </a:solidFill>
+                <a:latin typeface="+mn-lt"/>
+                <a:ea typeface="+mn-ea"/>
+                <a:cs typeface="+mn-cs"/>
+              </a:defRPr>
+            </a:lvl1pPr>
+            <a:lvl2pPr marL="685800" indent="-228600" algn="r" defTabSz="914400" rtl="1" eaLnBrk="1" latinLnBrk="0" hangingPunct="1">
+              <a:lnSpc>
+                <a:spcPct val="90000"/>
+              </a:lnSpc>
+              <a:spcBef>
+                <a:spcPts val="500"/>
+              </a:spcBef>
+              <a:buFont typeface="Arial" panose="020B0604020202020204" pitchFamily="34" charset="0"/>
+              <a:buChar char="•"/>
+              <a:defRPr sz="2400" kern="1200">
+                <a:solidFill>
+                  <a:schemeClr val="tx1"/>
+                </a:solidFill>
+                <a:latin typeface="+mn-lt"/>
+                <a:ea typeface="+mn-ea"/>
+                <a:cs typeface="+mn-cs"/>
+              </a:defRPr>
+            </a:lvl2pPr>
+            <a:lvl3pPr marL="1143000" indent="-228600" algn="r" defTabSz="914400" rtl="1" eaLnBrk="1" latinLnBrk="0" hangingPunct="1">
+              <a:lnSpc>
+                <a:spcPct val="90000"/>
+              </a:lnSpc>
+              <a:spcBef>
+                <a:spcPts val="500"/>
+              </a:spcBef>
+              <a:buFont typeface="Arial" panose="020B0604020202020204" pitchFamily="34" charset="0"/>
+              <a:buChar char="•"/>
+              <a:defRPr sz="2000" kern="1200">
+                <a:solidFill>
+                  <a:schemeClr val="tx1"/>
+                </a:solidFill>
+                <a:latin typeface="+mn-lt"/>
+                <a:ea typeface="+mn-ea"/>
+                <a:cs typeface="+mn-cs"/>
+              </a:defRPr>
+            </a:lvl3pPr>
+            <a:lvl4pPr marL="1600200" indent="-228600" algn="r" defTabSz="914400" rtl="1" eaLnBrk="1" latinLnBrk="0" hangingPunct="1">
+              <a:lnSpc>
+                <a:spcPct val="90000"/>
+              </a:lnSpc>
+              <a:spcBef>
+                <a:spcPts val="500"/>
+              </a:spcBef>
+              <a:buFont typeface="Arial" panose="020B0604020202020204" pitchFamily="34" charset="0"/>
+              <a:buChar char="•"/>
+              <a:defRPr sz="1800" kern="1200">
+                <a:solidFill>
+                  <a:schemeClr val="tx1"/>
+                </a:solidFill>
+                <a:latin typeface="+mn-lt"/>
+                <a:ea typeface="+mn-ea"/>
+                <a:cs typeface="+mn-cs"/>
+              </a:defRPr>
+            </a:lvl4pPr>
+            <a:lvl5pPr marL="2057400" indent="-228600" algn="r" defTabSz="914400" rtl="1" eaLnBrk="1" latinLnBrk="0" hangingPunct="1">
+              <a:lnSpc>
+                <a:spcPct val="90000"/>
+              </a:lnSpc>
+              <a:spcBef>
+                <a:spcPts val="500"/>
+              </a:spcBef>
+              <a:buFont typeface="Arial" panose="020B0604020202020204" pitchFamily="34" charset="0"/>
+              <a:buChar char="•"/>
+              <a:defRPr sz="1800" kern="1200">
+                <a:solidFill>
+                  <a:schemeClr val="tx1"/>
+                </a:solidFill>
+                <a:latin typeface="+mn-lt"/>
+                <a:ea typeface="+mn-ea"/>
+                <a:cs typeface="+mn-cs"/>
+              </a:defRPr>
+            </a:lvl5pPr>
+            <a:lvl6pPr marL="2514600" indent="-228600" algn="r" defTabSz="914400" rtl="1" eaLnBrk="1" latinLnBrk="0" hangingPunct="1">
+              <a:lnSpc>
+                <a:spcPct val="90000"/>
+              </a:lnSpc>
+              <a:spcBef>
+                <a:spcPts val="500"/>
+              </a:spcBef>
+              <a:buFont typeface="Arial" panose="020B0604020202020204" pitchFamily="34" charset="0"/>
+              <a:buChar char="•"/>
+              <a:defRPr sz="1800" kern="1200">
+                <a:solidFill>
+                  <a:schemeClr val="tx1"/>
+                </a:solidFill>
+                <a:latin typeface="+mn-lt"/>
+                <a:ea typeface="+mn-ea"/>
+                <a:cs typeface="+mn-cs"/>
+              </a:defRPr>
+            </a:lvl6pPr>
+            <a:lvl7pPr marL="2971800" indent="-228600" algn="r" defTabSz="914400" rtl="1" eaLnBrk="1" latinLnBrk="0" hangingPunct="1">
+              <a:lnSpc>
+                <a:spcPct val="90000"/>
+              </a:lnSpc>
+              <a:spcBef>
+                <a:spcPts val="500"/>
+              </a:spcBef>
+              <a:buFont typeface="Arial" panose="020B0604020202020204" pitchFamily="34" charset="0"/>
+              <a:buChar char="•"/>
+              <a:defRPr sz="1800" kern="1200">
+                <a:solidFill>
+                  <a:schemeClr val="tx1"/>
+                </a:solidFill>
+                <a:latin typeface="+mn-lt"/>
+                <a:ea typeface="+mn-ea"/>
+                <a:cs typeface="+mn-cs"/>
+              </a:defRPr>
+            </a:lvl7pPr>
+            <a:lvl8pPr marL="3429000" indent="-228600" algn="r" defTabSz="914400" rtl="1" eaLnBrk="1" latinLnBrk="0" hangingPunct="1">
+              <a:lnSpc>
+                <a:spcPct val="90000"/>
+              </a:lnSpc>
+              <a:spcBef>
+                <a:spcPts val="500"/>
+              </a:spcBef>
+              <a:buFont typeface="Arial" panose="020B0604020202020204" pitchFamily="34" charset="0"/>
+              <a:buChar char="•"/>
+              <a:defRPr sz="1800" kern="1200">
+                <a:solidFill>
+                  <a:schemeClr val="tx1"/>
+                </a:solidFill>
+                <a:latin typeface="+mn-lt"/>
+                <a:ea typeface="+mn-ea"/>
+                <a:cs typeface="+mn-cs"/>
+              </a:defRPr>
+            </a:lvl8pPr>
+            <a:lvl9pPr marL="3886200" indent="-228600" algn="r" defTabSz="914400" rtl="1" eaLnBrk="1" latinLnBrk="0" hangingPunct="1">
+              <a:lnSpc>
+                <a:spcPct val="90000"/>
+              </a:lnSpc>
+              <a:spcBef>
+                <a:spcPts val="500"/>
+              </a:spcBef>
+              <a:buFont typeface="Arial" panose="020B0604020202020204" pitchFamily="34" charset="0"/>
+              <a:buChar char="•"/>
+              <a:defRPr sz="1800" kern="1200">
+                <a:solidFill>
+                  <a:schemeClr val="tx1"/>
+                </a:solidFill>
+                <a:latin typeface="+mn-lt"/>
+                <a:ea typeface="+mn-ea"/>
+                <a:cs typeface="+mn-cs"/>
+              </a:defRPr>
+            </a:lvl9pPr>
+          </a:lstStyle>
+          <a:p>
+            <a:pPr marL="514350" indent="-514350" algn="l" rtl="0">
+              <a:buFont typeface="+mj-lt"/>
+              <a:buAutoNum type="arabicPeriod"/>
+            </a:pPr>
+            <a:r>
+              <a:rPr lang="en-US" dirty="0">
+                <a:solidFill>
+                  <a:schemeClr val="bg1">
+                    <a:lumMod val="85000"/>
+                  </a:schemeClr>
+                </a:solidFill>
+              </a:rPr>
+              <a:t>Simulate the environment </a:t>
+            </a:r>
+          </a:p>
+          <a:p>
+            <a:pPr lvl="1" algn="l" rtl="0"/>
+            <a:r>
+              <a:rPr lang="en-US" dirty="0">
+                <a:solidFill>
+                  <a:schemeClr val="bg1">
+                    <a:lumMod val="85000"/>
+                  </a:schemeClr>
+                </a:solidFill>
+              </a:rPr>
+              <a:t>Create a huge datasets in seconds</a:t>
+            </a:r>
+          </a:p>
+          <a:p>
+            <a:pPr lvl="1" algn="l" rtl="0"/>
+            <a:r>
+              <a:rPr lang="en-US" dirty="0">
+                <a:solidFill>
+                  <a:schemeClr val="bg1">
+                    <a:lumMod val="85000"/>
+                  </a:schemeClr>
+                </a:solidFill>
+              </a:rPr>
+              <a:t>Train a pose estimation pipe on synthetic images (based on RetinaNet</a:t>
+            </a:r>
+            <a:r>
+              <a:rPr lang="en-US" baseline="30000" dirty="0">
+                <a:solidFill>
+                  <a:schemeClr val="bg1">
+                    <a:lumMod val="85000"/>
+                  </a:schemeClr>
+                </a:solidFill>
+              </a:rPr>
+              <a:t>1</a:t>
+            </a:r>
+            <a:r>
+              <a:rPr lang="en-US" dirty="0">
+                <a:solidFill>
+                  <a:schemeClr val="bg1">
+                    <a:lumMod val="85000"/>
+                  </a:schemeClr>
+                </a:solidFill>
+              </a:rPr>
+              <a:t>)</a:t>
+            </a:r>
+          </a:p>
+          <a:p>
+            <a:pPr marL="514350" indent="-514350" algn="l" rtl="0">
+              <a:buFont typeface="+mj-lt"/>
+              <a:buAutoNum type="arabicPeriod"/>
+            </a:pPr>
             <a:r>
               <a:rPr lang="en-US" dirty="0"/>
-              <a:t>Out of 150 grasps and attempts to assemble, 133 were successful (88.67%)</a:t>
-            </a:r>
-          </a:p>
-          <a:p>
-            <a:pPr algn="l" rtl="0"/>
+              <a:t>Estimate the parts’ poses using RGB-D images</a:t>
+            </a:r>
+          </a:p>
+          <a:p>
+            <a:pPr lvl="1" algn="l" rtl="0"/>
             <a:r>
               <a:rPr lang="en-US" dirty="0"/>
-              <a:t>In 15 experiments, all parts were successfully assembled (50%).</a:t>
-            </a:r>
-          </a:p>
-          <a:p>
-            <a:pPr algn="l" rtl="0"/>
+              <a:t>Average 10-images to eliminate noise</a:t>
+            </a:r>
+          </a:p>
+          <a:p>
+            <a:pPr lvl="1" algn="l" rtl="0"/>
             <a:r>
               <a:rPr lang="en-US" dirty="0"/>
-              <a:t>In 5 of the 15 failed attempts, the gripper succeeded to grasp one of the shafts but let it slip while lifting.</a:t>
-            </a:r>
-          </a:p>
-          <a:p>
-            <a:pPr algn="l" rtl="0"/>
-            <a:r>
-              <a:rPr lang="en-US" dirty="0"/>
-              <a:t>In the remaining 10 attempts, the grasped part contacted the base plate which triggered a search, during which the part slipped</a:t>
-            </a:r>
-          </a:p>
-          <a:p>
-            <a:pPr algn="l" rtl="0"/>
-            <a:endParaRPr lang="en-US" dirty="0"/>
+              <a:t>Bridge the simulation-reality gap</a:t>
+            </a:r>
           </a:p>
         </p:txBody>
       </p:sp>
     </p:spTree>
     <p:extLst>
       <p:ext uri="{BB962C8B-B14F-4D97-AF65-F5344CB8AC3E}">
-        <p14:creationId xmlns:p14="http://schemas.microsoft.com/office/powerpoint/2010/main" val="2725942704"/>
+        <p14:creationId xmlns:p14="http://schemas.microsoft.com/office/powerpoint/2010/main" val="2466014209"/>
       </p:ext>
     </p:extLst>
   </p:cSld>
   <p:clrMapOvr>
     <a:masterClrMapping/>
   </p:clrMapOvr>
+  <p:timing>
+    <p:tnLst>
+      <p:par>
+        <p:cTn id="1" dur="indefinite" restart="never" nodeType="tmRoot">
+          <p:childTnLst>
+            <p:seq concurrent="1" nextAc="seek">
+              <p:cTn id="2" dur="indefinite" nodeType="mainSeq">
+                <p:childTnLst>
+                  <p:par>
+                    <p:cTn id="3" fill="hold">
+                      <p:stCondLst>
+                        <p:cond delay="indefinite"/>
+                      </p:stCondLst>
+                      <p:childTnLst>
+                        <p:par>
+                          <p:cTn id="4" fill="hold">
+                            <p:stCondLst>
+                              <p:cond delay="0"/>
+                            </p:stCondLst>
+                            <p:childTnLst>
+                              <p:par>
+                                <p:cTn id="5" presetID="10" presetClass="entr" presetSubtype="0" fill="hold" grpId="0" nodeType="clickEffect">
+                                  <p:stCondLst>
+                                    <p:cond delay="0"/>
+                                  </p:stCondLst>
+                                  <p:childTnLst>
+                                    <p:set>
+                                      <p:cBhvr>
+                                        <p:cTn id="6" dur="1" fill="hold">
+                                          <p:stCondLst>
+                                            <p:cond delay="0"/>
+                                          </p:stCondLst>
+                                        </p:cTn>
+                                        <p:tgtEl>
+                                          <p:spTgt spid="10"/>
+                                        </p:tgtEl>
+                                        <p:attrNameLst>
+                                          <p:attrName>style.visibility</p:attrName>
+                                        </p:attrNameLst>
+                                      </p:cBhvr>
+                                      <p:to>
+                                        <p:strVal val="visible"/>
+                                      </p:to>
+                                    </p:set>
+                                    <p:animEffect transition="in" filter="fade">
+                                      <p:cBhvr>
+                                        <p:cTn id="7" dur="500"/>
+                                        <p:tgtEl>
+                                          <p:spTgt spid="10"/>
+                                        </p:tgtEl>
+                                      </p:cBhvr>
+                                    </p:animEffect>
+                                  </p:childTnLst>
+                                </p:cTn>
+                              </p:par>
+                              <p:par>
+                                <p:cTn id="8" presetID="10" presetClass="entr" presetSubtype="0" fill="hold" grpId="0" nodeType="withEffect">
+                                  <p:stCondLst>
+                                    <p:cond delay="0"/>
+                                  </p:stCondLst>
+                                  <p:childTnLst>
+                                    <p:set>
+                                      <p:cBhvr>
+                                        <p:cTn id="9" dur="1" fill="hold">
+                                          <p:stCondLst>
+                                            <p:cond delay="0"/>
+                                          </p:stCondLst>
+                                        </p:cTn>
+                                        <p:tgtEl>
+                                          <p:spTgt spid="11"/>
+                                        </p:tgtEl>
+                                        <p:attrNameLst>
+                                          <p:attrName>style.visibility</p:attrName>
+                                        </p:attrNameLst>
+                                      </p:cBhvr>
+                                      <p:to>
+                                        <p:strVal val="visible"/>
+                                      </p:to>
+                                    </p:set>
+                                    <p:animEffect transition="in" filter="fade">
+                                      <p:cBhvr>
+                                        <p:cTn id="10" dur="500"/>
+                                        <p:tgtEl>
+                                          <p:spTgt spid="11"/>
+                                        </p:tgtEl>
+                                      </p:cBhvr>
+                                    </p:animEffect>
+                                  </p:childTnLst>
+                                </p:cTn>
+                              </p:par>
+                            </p:childTnLst>
+                          </p:cTn>
+                        </p:par>
+                      </p:childTnLst>
+                    </p:cTn>
+                  </p:par>
+                </p:childTnLst>
+              </p:cTn>
+              <p:prevCondLst>
+                <p:cond evt="onPrev" delay="0">
+                  <p:tgtEl>
+                    <p:sldTgt/>
+                  </p:tgtEl>
+                </p:cond>
+              </p:prevCondLst>
+              <p:nextCondLst>
+                <p:cond evt="onNext" delay="0">
+                  <p:tgtEl>
+                    <p:sldTgt/>
+                  </p:tgtEl>
+                </p:cond>
+              </p:nextCondLst>
+            </p:seq>
+          </p:childTnLst>
+        </p:cTn>
+      </p:par>
+    </p:tnLst>
+    <p:bldLst>
+      <p:bldP spid="10" grpId="0"/>
+      <p:bldP spid="11" grpId="0"/>
+    </p:bldLst>
+  </p:timing>
 </p:sld>
 </file>
 
@@ -4183,7 +5408,7 @@
           <p:cNvPr id="2" name="Title 1">
             <a:extLst>
               <a:ext uri="{FF2B5EF4-FFF2-40B4-BE49-F238E27FC236}">
-                <a16:creationId xmlns:a16="http://schemas.microsoft.com/office/drawing/2014/main" id="{A2DFABF9-1F8F-4AFF-8CE3-12ACDCA901EA}"/>
+                <a16:creationId xmlns:a16="http://schemas.microsoft.com/office/drawing/2014/main" id="{2512CD09-D57B-468C-A382-371B2A4F90C1}"/>
               </a:ext>
             </a:extLst>
           </p:cNvPr>
@@ -4201,44 +5426,438 @@
           <a:p>
             <a:pPr algn="l" rtl="0"/>
             <a:r>
+              <a:rPr lang="en-US" b="1" dirty="0"/>
+              <a:t>Method</a:t>
+            </a:r>
+          </a:p>
+        </p:txBody>
+      </p:sp>
+      <p:sp>
+        <p:nvSpPr>
+          <p:cNvPr id="4" name="TextBox 3">
+            <a:extLst>
+              <a:ext uri="{FF2B5EF4-FFF2-40B4-BE49-F238E27FC236}">
+                <a16:creationId xmlns:a16="http://schemas.microsoft.com/office/drawing/2014/main" id="{B1ED8B72-D03D-4B69-916D-BE3A9632DBBB}"/>
+              </a:ext>
+            </a:extLst>
+          </p:cNvPr>
+          <p:cNvSpPr txBox="1"/>
+          <p:nvPr/>
+        </p:nvSpPr>
+        <p:spPr>
+          <a:xfrm>
+            <a:off x="0" y="6492875"/>
+            <a:ext cx="9694898" cy="369332"/>
+          </a:xfrm>
+          <a:prstGeom prst="rect">
+            <a:avLst/>
+          </a:prstGeom>
+          <a:noFill/>
+        </p:spPr>
+        <p:txBody>
+          <a:bodyPr wrap="none" rtlCol="1">
+            <a:spAutoFit/>
+          </a:bodyPr>
+          <a:lstStyle/>
+          <a:p>
+            <a:pPr algn="l" rtl="0"/>
+            <a:r>
               <a:rPr lang="en-US" dirty="0"/>
-              <a:t>Conclusion</a:t>
-            </a:r>
-          </a:p>
-        </p:txBody>
-      </p:sp>
-      <p:sp>
-        <p:nvSpPr>
-          <p:cNvPr id="3" name="Content Placeholder 2">
-            <a:extLst>
-              <a:ext uri="{FF2B5EF4-FFF2-40B4-BE49-F238E27FC236}">
-                <a16:creationId xmlns:a16="http://schemas.microsoft.com/office/drawing/2014/main" id="{1612A23E-D17C-4E14-B6FC-42D91266DE72}"/>
-              </a:ext>
-            </a:extLst>
-          </p:cNvPr>
-          <p:cNvSpPr>
-            <a:spLocks noGrp="1"/>
-          </p:cNvSpPr>
-          <p:nvPr>
-            <p:ph idx="1"/>
-          </p:nvPr>
-        </p:nvSpPr>
-        <p:spPr/>
-        <p:txBody>
-          <a:bodyPr/>
-          <a:lstStyle/>
-          <a:p>
-            <a:pPr algn="l" rtl="0"/>
+              <a:t>1. Lin, T. Y., Goyal, P., </a:t>
+            </a:r>
+            <a:r>
+              <a:rPr lang="en-US" dirty="0" err="1"/>
+              <a:t>Girshick</a:t>
+            </a:r>
             <a:r>
               <a:rPr lang="en-US" dirty="0"/>
-              <a:t>An assembly task with given 3D CAD files, an accurate pose estimation algorithm can be trained to achieve high assembly success rates.</a:t>
-            </a:r>
-          </a:p>
-          <a:p>
-            <a:pPr algn="l" rtl="0"/>
+              <a:t>, R., He, K., &amp; </a:t>
+            </a:r>
+            <a:r>
+              <a:rPr lang="en-US" dirty="0" err="1"/>
+              <a:t>Dollár</a:t>
+            </a:r>
             <a:r>
               <a:rPr lang="en-US" dirty="0"/>
-              <a:t>The simulation-to-reality gap can be significantly bridged by using depth images and the assembly task can be learned on simulated images only.</a:t>
+              <a:t>, P. (2017). Focal loss for dense object detection. </a:t>
+            </a:r>
+            <a:r>
+              <a:rPr lang="en-US" i="1" dirty="0"/>
+              <a:t>ICCV</a:t>
+            </a:r>
+            <a:r>
+              <a:rPr lang="en-US" dirty="0"/>
+              <a:t>‏</a:t>
+            </a:r>
+            <a:endParaRPr lang="he-IL" dirty="0"/>
+          </a:p>
+        </p:txBody>
+      </p:sp>
+      <p:pic>
+        <p:nvPicPr>
+          <p:cNvPr id="5" name="הקלטת מסך 2021-11-20 ב-11.15.52">
+            <a:hlinkClick r:id="" action="ppaction://media"/>
+            <a:extLst>
+              <a:ext uri="{FF2B5EF4-FFF2-40B4-BE49-F238E27FC236}">
+                <a16:creationId xmlns:a16="http://schemas.microsoft.com/office/drawing/2014/main" id="{7BE62CE1-A90E-4464-8FE6-31BB3B82D855}"/>
+              </a:ext>
+            </a:extLst>
+          </p:cNvPr>
+          <p:cNvPicPr>
+            <a:picLocks noChangeAspect="1"/>
+          </p:cNvPicPr>
+          <p:nvPr>
+            <a:videoFile r:link="rId1"/>
+            <p:extLst>
+              <p:ext uri="{DAA4B4D4-6D71-4841-9C94-3DE7FCFB9230}">
+                <p14:media xmlns:p14="http://schemas.microsoft.com/office/powerpoint/2010/main" r:embed="rId2">
+                  <p14:trim st="2941"/>
+                </p14:media>
+              </p:ext>
+            </p:extLst>
+          </p:nvPr>
+        </p:nvPicPr>
+        <p:blipFill>
+          <a:blip r:embed="rId4"/>
+          <a:stretch>
+            <a:fillRect/>
+          </a:stretch>
+        </p:blipFill>
+        <p:spPr>
+          <a:xfrm>
+            <a:off x="9694898" y="3283527"/>
+            <a:ext cx="2062756" cy="2551112"/>
+          </a:xfrm>
+          <a:prstGeom prst="rect">
+            <a:avLst/>
+          </a:prstGeom>
+        </p:spPr>
+      </p:pic>
+      <p:sp>
+        <p:nvSpPr>
+          <p:cNvPr id="8" name="Content Placeholder 2">
+            <a:extLst>
+              <a:ext uri="{FF2B5EF4-FFF2-40B4-BE49-F238E27FC236}">
+                <a16:creationId xmlns:a16="http://schemas.microsoft.com/office/drawing/2014/main" id="{8EE73EF2-8279-4569-9814-83845800CBB4}"/>
+              </a:ext>
+            </a:extLst>
+          </p:cNvPr>
+          <p:cNvSpPr txBox="1">
+            <a:spLocks/>
+          </p:cNvSpPr>
+          <p:nvPr/>
+        </p:nvSpPr>
+        <p:spPr>
+          <a:xfrm>
+            <a:off x="838200" y="1427018"/>
+            <a:ext cx="10515600" cy="5065857"/>
+          </a:xfrm>
+          <a:prstGeom prst="rect">
+            <a:avLst/>
+          </a:prstGeom>
+        </p:spPr>
+        <p:txBody>
+          <a:bodyPr vert="horz" lIns="91440" tIns="45720" rIns="91440" bIns="45720" rtlCol="1">
+            <a:normAutofit/>
+          </a:bodyPr>
+          <a:lstStyle>
+            <a:lvl1pPr marL="228600" indent="-228600" algn="r" defTabSz="914400" rtl="1" eaLnBrk="1" latinLnBrk="0" hangingPunct="1">
+              <a:lnSpc>
+                <a:spcPct val="90000"/>
+              </a:lnSpc>
+              <a:spcBef>
+                <a:spcPts val="1000"/>
+              </a:spcBef>
+              <a:buFont typeface="Arial" panose="020B0604020202020204" pitchFamily="34" charset="0"/>
+              <a:buChar char="•"/>
+              <a:defRPr sz="2800" kern="1200">
+                <a:solidFill>
+                  <a:schemeClr val="tx1"/>
+                </a:solidFill>
+                <a:latin typeface="+mn-lt"/>
+                <a:ea typeface="+mn-ea"/>
+                <a:cs typeface="+mn-cs"/>
+              </a:defRPr>
+            </a:lvl1pPr>
+            <a:lvl2pPr marL="685800" indent="-228600" algn="r" defTabSz="914400" rtl="1" eaLnBrk="1" latinLnBrk="0" hangingPunct="1">
+              <a:lnSpc>
+                <a:spcPct val="90000"/>
+              </a:lnSpc>
+              <a:spcBef>
+                <a:spcPts val="500"/>
+              </a:spcBef>
+              <a:buFont typeface="Arial" panose="020B0604020202020204" pitchFamily="34" charset="0"/>
+              <a:buChar char="•"/>
+              <a:defRPr sz="2400" kern="1200">
+                <a:solidFill>
+                  <a:schemeClr val="tx1"/>
+                </a:solidFill>
+                <a:latin typeface="+mn-lt"/>
+                <a:ea typeface="+mn-ea"/>
+                <a:cs typeface="+mn-cs"/>
+              </a:defRPr>
+            </a:lvl2pPr>
+            <a:lvl3pPr marL="1143000" indent="-228600" algn="r" defTabSz="914400" rtl="1" eaLnBrk="1" latinLnBrk="0" hangingPunct="1">
+              <a:lnSpc>
+                <a:spcPct val="90000"/>
+              </a:lnSpc>
+              <a:spcBef>
+                <a:spcPts val="500"/>
+              </a:spcBef>
+              <a:buFont typeface="Arial" panose="020B0604020202020204" pitchFamily="34" charset="0"/>
+              <a:buChar char="•"/>
+              <a:defRPr sz="2000" kern="1200">
+                <a:solidFill>
+                  <a:schemeClr val="tx1"/>
+                </a:solidFill>
+                <a:latin typeface="+mn-lt"/>
+                <a:ea typeface="+mn-ea"/>
+                <a:cs typeface="+mn-cs"/>
+              </a:defRPr>
+            </a:lvl3pPr>
+            <a:lvl4pPr marL="1600200" indent="-228600" algn="r" defTabSz="914400" rtl="1" eaLnBrk="1" latinLnBrk="0" hangingPunct="1">
+              <a:lnSpc>
+                <a:spcPct val="90000"/>
+              </a:lnSpc>
+              <a:spcBef>
+                <a:spcPts val="500"/>
+              </a:spcBef>
+              <a:buFont typeface="Arial" panose="020B0604020202020204" pitchFamily="34" charset="0"/>
+              <a:buChar char="•"/>
+              <a:defRPr sz="1800" kern="1200">
+                <a:solidFill>
+                  <a:schemeClr val="tx1"/>
+                </a:solidFill>
+                <a:latin typeface="+mn-lt"/>
+                <a:ea typeface="+mn-ea"/>
+                <a:cs typeface="+mn-cs"/>
+              </a:defRPr>
+            </a:lvl4pPr>
+            <a:lvl5pPr marL="2057400" indent="-228600" algn="r" defTabSz="914400" rtl="1" eaLnBrk="1" latinLnBrk="0" hangingPunct="1">
+              <a:lnSpc>
+                <a:spcPct val="90000"/>
+              </a:lnSpc>
+              <a:spcBef>
+                <a:spcPts val="500"/>
+              </a:spcBef>
+              <a:buFont typeface="Arial" panose="020B0604020202020204" pitchFamily="34" charset="0"/>
+              <a:buChar char="•"/>
+              <a:defRPr sz="1800" kern="1200">
+                <a:solidFill>
+                  <a:schemeClr val="tx1"/>
+                </a:solidFill>
+                <a:latin typeface="+mn-lt"/>
+                <a:ea typeface="+mn-ea"/>
+                <a:cs typeface="+mn-cs"/>
+              </a:defRPr>
+            </a:lvl5pPr>
+            <a:lvl6pPr marL="2514600" indent="-228600" algn="r" defTabSz="914400" rtl="1" eaLnBrk="1" latinLnBrk="0" hangingPunct="1">
+              <a:lnSpc>
+                <a:spcPct val="90000"/>
+              </a:lnSpc>
+              <a:spcBef>
+                <a:spcPts val="500"/>
+              </a:spcBef>
+              <a:buFont typeface="Arial" panose="020B0604020202020204" pitchFamily="34" charset="0"/>
+              <a:buChar char="•"/>
+              <a:defRPr sz="1800" kern="1200">
+                <a:solidFill>
+                  <a:schemeClr val="tx1"/>
+                </a:solidFill>
+                <a:latin typeface="+mn-lt"/>
+                <a:ea typeface="+mn-ea"/>
+                <a:cs typeface="+mn-cs"/>
+              </a:defRPr>
+            </a:lvl6pPr>
+            <a:lvl7pPr marL="2971800" indent="-228600" algn="r" defTabSz="914400" rtl="1" eaLnBrk="1" latinLnBrk="0" hangingPunct="1">
+              <a:lnSpc>
+                <a:spcPct val="90000"/>
+              </a:lnSpc>
+              <a:spcBef>
+                <a:spcPts val="500"/>
+              </a:spcBef>
+              <a:buFont typeface="Arial" panose="020B0604020202020204" pitchFamily="34" charset="0"/>
+              <a:buChar char="•"/>
+              <a:defRPr sz="1800" kern="1200">
+                <a:solidFill>
+                  <a:schemeClr val="tx1"/>
+                </a:solidFill>
+                <a:latin typeface="+mn-lt"/>
+                <a:ea typeface="+mn-ea"/>
+                <a:cs typeface="+mn-cs"/>
+              </a:defRPr>
+            </a:lvl7pPr>
+            <a:lvl8pPr marL="3429000" indent="-228600" algn="r" defTabSz="914400" rtl="1" eaLnBrk="1" latinLnBrk="0" hangingPunct="1">
+              <a:lnSpc>
+                <a:spcPct val="90000"/>
+              </a:lnSpc>
+              <a:spcBef>
+                <a:spcPts val="500"/>
+              </a:spcBef>
+              <a:buFont typeface="Arial" panose="020B0604020202020204" pitchFamily="34" charset="0"/>
+              <a:buChar char="•"/>
+              <a:defRPr sz="1800" kern="1200">
+                <a:solidFill>
+                  <a:schemeClr val="tx1"/>
+                </a:solidFill>
+                <a:latin typeface="+mn-lt"/>
+                <a:ea typeface="+mn-ea"/>
+                <a:cs typeface="+mn-cs"/>
+              </a:defRPr>
+            </a:lvl8pPr>
+            <a:lvl9pPr marL="3886200" indent="-228600" algn="r" defTabSz="914400" rtl="1" eaLnBrk="1" latinLnBrk="0" hangingPunct="1">
+              <a:lnSpc>
+                <a:spcPct val="90000"/>
+              </a:lnSpc>
+              <a:spcBef>
+                <a:spcPts val="500"/>
+              </a:spcBef>
+              <a:buFont typeface="Arial" panose="020B0604020202020204" pitchFamily="34" charset="0"/>
+              <a:buChar char="•"/>
+              <a:defRPr sz="1800" kern="1200">
+                <a:solidFill>
+                  <a:schemeClr val="tx1"/>
+                </a:solidFill>
+                <a:latin typeface="+mn-lt"/>
+                <a:ea typeface="+mn-ea"/>
+                <a:cs typeface="+mn-cs"/>
+              </a:defRPr>
+            </a:lvl9pPr>
+          </a:lstStyle>
+          <a:p>
+            <a:pPr marL="514350" indent="-514350" algn="l" rtl="0">
+              <a:buFont typeface="+mj-lt"/>
+              <a:buAutoNum type="arabicPeriod"/>
+            </a:pPr>
+            <a:r>
+              <a:rPr lang="en-US" dirty="0">
+                <a:solidFill>
+                  <a:schemeClr val="bg1">
+                    <a:lumMod val="85000"/>
+                  </a:schemeClr>
+                </a:solidFill>
+              </a:rPr>
+              <a:t>Simulate the environment </a:t>
+            </a:r>
+          </a:p>
+          <a:p>
+            <a:pPr lvl="1" algn="l" rtl="0"/>
+            <a:r>
+              <a:rPr lang="en-US" dirty="0">
+                <a:solidFill>
+                  <a:schemeClr val="bg1">
+                    <a:lumMod val="85000"/>
+                  </a:schemeClr>
+                </a:solidFill>
+              </a:rPr>
+              <a:t>Create a huge datasets in seconds</a:t>
+            </a:r>
+          </a:p>
+          <a:p>
+            <a:pPr lvl="1" algn="l" rtl="0"/>
+            <a:r>
+              <a:rPr lang="en-US" dirty="0">
+                <a:solidFill>
+                  <a:schemeClr val="bg1">
+                    <a:lumMod val="85000"/>
+                  </a:schemeClr>
+                </a:solidFill>
+              </a:rPr>
+              <a:t>Train a pose estimation pipe on synthetic images (based on RetinaNet</a:t>
+            </a:r>
+            <a:r>
+              <a:rPr lang="en-US" baseline="30000" dirty="0">
+                <a:solidFill>
+                  <a:schemeClr val="bg1">
+                    <a:lumMod val="85000"/>
+                  </a:schemeClr>
+                </a:solidFill>
+              </a:rPr>
+              <a:t>1</a:t>
+            </a:r>
+            <a:r>
+              <a:rPr lang="en-US" dirty="0">
+                <a:solidFill>
+                  <a:schemeClr val="bg1">
+                    <a:lumMod val="85000"/>
+                  </a:schemeClr>
+                </a:solidFill>
+              </a:rPr>
+              <a:t>)</a:t>
+            </a:r>
+          </a:p>
+          <a:p>
+            <a:pPr marL="514350" indent="-514350" algn="l" rtl="0">
+              <a:buFont typeface="+mj-lt"/>
+              <a:buAutoNum type="arabicPeriod"/>
+            </a:pPr>
+            <a:r>
+              <a:rPr lang="en-US" dirty="0">
+                <a:solidFill>
+                  <a:schemeClr val="bg1">
+                    <a:lumMod val="85000"/>
+                  </a:schemeClr>
+                </a:solidFill>
+              </a:rPr>
+              <a:t>Estimate the parts’ poses using RGB-D images</a:t>
+            </a:r>
+          </a:p>
+          <a:p>
+            <a:pPr lvl="1" algn="l" rtl="0"/>
+            <a:r>
+              <a:rPr lang="en-US" dirty="0">
+                <a:solidFill>
+                  <a:schemeClr val="bg1">
+                    <a:lumMod val="85000"/>
+                  </a:schemeClr>
+                </a:solidFill>
+              </a:rPr>
+              <a:t>Average 10-images to eliminate noise</a:t>
+            </a:r>
+          </a:p>
+          <a:p>
+            <a:pPr lvl="1" algn="l" rtl="0"/>
+            <a:r>
+              <a:rPr lang="en-US" dirty="0">
+                <a:solidFill>
+                  <a:schemeClr val="bg1">
+                    <a:lumMod val="85000"/>
+                  </a:schemeClr>
+                </a:solidFill>
+              </a:rPr>
+              <a:t>Bridge the simulation-reality gap</a:t>
+            </a:r>
+          </a:p>
+          <a:p>
+            <a:pPr marL="514350" indent="-514350" algn="l" rtl="0">
+              <a:buFont typeface="+mj-lt"/>
+              <a:buAutoNum type="arabicPeriod"/>
+            </a:pPr>
+            <a:r>
+              <a:rPr lang="en-US" dirty="0"/>
+              <a:t>Calculate pick-and-place motions for each part</a:t>
+            </a:r>
+          </a:p>
+          <a:p>
+            <a:pPr lvl="1" algn="l" rtl="0"/>
+            <a:r>
+              <a:rPr lang="en-US" dirty="0"/>
+              <a:t>‘</a:t>
+            </a:r>
+            <a:r>
+              <a:rPr lang="en-US" dirty="0" err="1"/>
+              <a:t>Moveit</a:t>
+            </a:r>
+            <a:r>
+              <a:rPr lang="en-US" dirty="0"/>
+              <a:t>!’ for motion trajectory</a:t>
+            </a:r>
+          </a:p>
+          <a:p>
+            <a:pPr lvl="1" algn="l" rtl="0"/>
+            <a:r>
+              <a:rPr lang="en-US" dirty="0"/>
+              <a:t>Use prior knowledge to place the parts in the correct location</a:t>
             </a:r>
           </a:p>
         </p:txBody>
@@ -4246,13 +5865,151 @@
     </p:spTree>
     <p:extLst>
       <p:ext uri="{BB962C8B-B14F-4D97-AF65-F5344CB8AC3E}">
-        <p14:creationId xmlns:p14="http://schemas.microsoft.com/office/powerpoint/2010/main" val="3944448936"/>
+        <p14:creationId xmlns:p14="http://schemas.microsoft.com/office/powerpoint/2010/main" val="222958390"/>
       </p:ext>
     </p:extLst>
   </p:cSld>
   <p:clrMapOvr>
     <a:masterClrMapping/>
   </p:clrMapOvr>
+  <p:timing>
+    <p:tnLst>
+      <p:par>
+        <p:cTn id="1" dur="indefinite" restart="never" nodeType="tmRoot">
+          <p:childTnLst>
+            <p:seq concurrent="1" nextAc="seek">
+              <p:cTn id="2" dur="indefinite" nodeType="mainSeq">
+                <p:childTnLst>
+                  <p:par>
+                    <p:cTn id="3" fill="hold">
+                      <p:stCondLst>
+                        <p:cond delay="indefinite"/>
+                        <p:cond evt="onBegin" delay="0">
+                          <p:tn val="2"/>
+                        </p:cond>
+                      </p:stCondLst>
+                      <p:childTnLst>
+                        <p:par>
+                          <p:cTn id="4" fill="hold">
+                            <p:stCondLst>
+                              <p:cond delay="0"/>
+                            </p:stCondLst>
+                            <p:childTnLst>
+                              <p:par>
+                                <p:cTn id="5" presetID="1" presetClass="mediacall" presetSubtype="0" fill="hold" nodeType="afterEffect">
+                                  <p:stCondLst>
+                                    <p:cond delay="0"/>
+                                  </p:stCondLst>
+                                  <p:childTnLst>
+                                    <p:cmd type="call" cmd="playFrom(0.0)">
+                                      <p:cBhvr>
+                                        <p:cTn id="6" dur="4442" fill="hold"/>
+                                        <p:tgtEl>
+                                          <p:spTgt spid="5"/>
+                                        </p:tgtEl>
+                                      </p:cBhvr>
+                                    </p:cmd>
+                                  </p:childTnLst>
+                                </p:cTn>
+                              </p:par>
+                            </p:childTnLst>
+                          </p:cTn>
+                        </p:par>
+                      </p:childTnLst>
+                    </p:cTn>
+                  </p:par>
+                </p:childTnLst>
+              </p:cTn>
+              <p:prevCondLst>
+                <p:cond evt="onPrev" delay="0">
+                  <p:tgtEl>
+                    <p:sldTgt/>
+                  </p:tgtEl>
+                </p:cond>
+              </p:prevCondLst>
+              <p:nextCondLst>
+                <p:cond evt="onNext" delay="0">
+                  <p:tgtEl>
+                    <p:sldTgt/>
+                  </p:tgtEl>
+                </p:cond>
+              </p:nextCondLst>
+            </p:seq>
+            <p:seq concurrent="1" nextAc="seek">
+              <p:cTn id="7" restart="whenNotActive" fill="hold" evtFilter="cancelBubble" nodeType="interactiveSeq">
+                <p:stCondLst>
+                  <p:cond evt="onClick" delay="0">
+                    <p:tgtEl>
+                      <p:spTgt spid="5"/>
+                    </p:tgtEl>
+                  </p:cond>
+                </p:stCondLst>
+                <p:endSync evt="end" delay="0">
+                  <p:rtn val="all"/>
+                </p:endSync>
+                <p:childTnLst>
+                  <p:par>
+                    <p:cTn id="8" fill="hold">
+                      <p:stCondLst>
+                        <p:cond delay="0"/>
+                      </p:stCondLst>
+                      <p:childTnLst>
+                        <p:par>
+                          <p:cTn id="9" fill="hold">
+                            <p:stCondLst>
+                              <p:cond delay="0"/>
+                            </p:stCondLst>
+                            <p:childTnLst>
+                              <p:par>
+                                <p:cTn id="10" presetID="2" presetClass="mediacall" presetSubtype="0" fill="hold" nodeType="clickEffect">
+                                  <p:stCondLst>
+                                    <p:cond delay="0"/>
+                                  </p:stCondLst>
+                                  <p:childTnLst>
+                                    <p:cmd type="call" cmd="togglePause">
+                                      <p:cBhvr>
+                                        <p:cTn id="11" dur="1" fill="hold"/>
+                                        <p:tgtEl>
+                                          <p:spTgt spid="5"/>
+                                        </p:tgtEl>
+                                      </p:cBhvr>
+                                    </p:cmd>
+                                  </p:childTnLst>
+                                </p:cTn>
+                              </p:par>
+                            </p:childTnLst>
+                          </p:cTn>
+                        </p:par>
+                      </p:childTnLst>
+                    </p:cTn>
+                  </p:par>
+                </p:childTnLst>
+              </p:cTn>
+              <p:nextCondLst>
+                <p:cond evt="onClick" delay="0">
+                  <p:tgtEl>
+                    <p:spTgt spid="5"/>
+                  </p:tgtEl>
+                </p:cond>
+              </p:nextCondLst>
+            </p:seq>
+            <p:video>
+              <p:cMediaNode vol="80000">
+                <p:cTn id="12" fill="hold" display="0">
+                  <p:stCondLst>
+                    <p:cond delay="indefinite"/>
+                  </p:stCondLst>
+                </p:cTn>
+                <p:tgtEl>
+                  <p:spTgt spid="5"/>
+                </p:tgtEl>
+              </p:cMediaNode>
+            </p:video>
+          </p:childTnLst>
+        </p:cTn>
+      </p:par>
+    </p:tnLst>
+  </p:timing>
 </p:sld>
 </file>
 
@@ -4275,10 +6032,10 @@
       </p:grpSpPr>
       <p:sp>
         <p:nvSpPr>
-          <p:cNvPr id="2" name="כותרת 1">
-            <a:extLst>
-              <a:ext uri="{FF2B5EF4-FFF2-40B4-BE49-F238E27FC236}">
-                <a16:creationId xmlns:a16="http://schemas.microsoft.com/office/drawing/2014/main" id="{9DFB064A-4F4F-40EB-B3E8-54FE4C7C1BCE}"/>
+          <p:cNvPr id="2" name="Title 1">
+            <a:extLst>
+              <a:ext uri="{FF2B5EF4-FFF2-40B4-BE49-F238E27FC236}">
+                <a16:creationId xmlns:a16="http://schemas.microsoft.com/office/drawing/2014/main" id="{2512CD09-D57B-468C-A382-371B2A4F90C1}"/>
               </a:ext>
             </a:extLst>
           </p:cNvPr>
@@ -4290,79 +6047,587 @@
           </p:nvPr>
         </p:nvSpPr>
         <p:spPr/>
+        <p:txBody>
+          <a:bodyPr/>
+          <a:lstStyle/>
+          <a:p>
+            <a:pPr algn="l" rtl="0"/>
+            <a:r>
+              <a:rPr lang="en-US" b="1" dirty="0"/>
+              <a:t>Method</a:t>
+            </a:r>
+          </a:p>
+        </p:txBody>
+      </p:sp>
+      <p:sp>
+        <p:nvSpPr>
+          <p:cNvPr id="3" name="Content Placeholder 2">
+            <a:extLst>
+              <a:ext uri="{FF2B5EF4-FFF2-40B4-BE49-F238E27FC236}">
+                <a16:creationId xmlns:a16="http://schemas.microsoft.com/office/drawing/2014/main" id="{7006DD66-4050-4406-8766-6D3E3F1C1E50}"/>
+              </a:ext>
+            </a:extLst>
+          </p:cNvPr>
+          <p:cNvSpPr>
+            <a:spLocks noGrp="1"/>
+          </p:cNvSpPr>
+          <p:nvPr>
+            <p:ph idx="1"/>
+          </p:nvPr>
+        </p:nvSpPr>
+        <p:spPr>
+          <a:xfrm>
+            <a:off x="838200" y="1427018"/>
+            <a:ext cx="10515600" cy="5065857"/>
+          </a:xfrm>
+        </p:spPr>
         <p:txBody>
           <a:bodyPr>
             <a:normAutofit/>
           </a:bodyPr>
           <a:lstStyle/>
           <a:p>
+            <a:pPr marL="514350" indent="-514350" algn="l" rtl="0">
+              <a:buFont typeface="+mj-lt"/>
+              <a:buAutoNum type="arabicPeriod"/>
+            </a:pPr>
+            <a:r>
+              <a:rPr lang="en-US" dirty="0">
+                <a:solidFill>
+                  <a:schemeClr val="bg1">
+                    <a:lumMod val="85000"/>
+                  </a:schemeClr>
+                </a:solidFill>
+              </a:rPr>
+              <a:t>Simulate the environment </a:t>
+            </a:r>
+          </a:p>
+          <a:p>
+            <a:pPr lvl="1" algn="l" rtl="0"/>
+            <a:r>
+              <a:rPr lang="en-US" dirty="0">
+                <a:solidFill>
+                  <a:schemeClr val="bg1">
+                    <a:lumMod val="85000"/>
+                  </a:schemeClr>
+                </a:solidFill>
+              </a:rPr>
+              <a:t>Create a huge datasets in seconds</a:t>
+            </a:r>
+          </a:p>
+          <a:p>
+            <a:pPr lvl="1" algn="l" rtl="0"/>
+            <a:r>
+              <a:rPr lang="en-US" dirty="0">
+                <a:solidFill>
+                  <a:schemeClr val="bg1">
+                    <a:lumMod val="85000"/>
+                  </a:schemeClr>
+                </a:solidFill>
+              </a:rPr>
+              <a:t>Train a pose estimation pipe on synthetic images (based on RetinaNet</a:t>
+            </a:r>
+            <a:r>
+              <a:rPr lang="en-US" baseline="30000" dirty="0">
+                <a:solidFill>
+                  <a:schemeClr val="bg1">
+                    <a:lumMod val="85000"/>
+                  </a:schemeClr>
+                </a:solidFill>
+              </a:rPr>
+              <a:t>1</a:t>
+            </a:r>
+            <a:r>
+              <a:rPr lang="en-US" dirty="0">
+                <a:solidFill>
+                  <a:schemeClr val="bg1">
+                    <a:lumMod val="85000"/>
+                  </a:schemeClr>
+                </a:solidFill>
+              </a:rPr>
+              <a:t>)</a:t>
+            </a:r>
+          </a:p>
+          <a:p>
+            <a:pPr marL="514350" indent="-514350" algn="l" rtl="0">
+              <a:buFont typeface="+mj-lt"/>
+              <a:buAutoNum type="arabicPeriod"/>
+            </a:pPr>
+            <a:r>
+              <a:rPr lang="en-US" dirty="0">
+                <a:solidFill>
+                  <a:schemeClr val="bg1">
+                    <a:lumMod val="85000"/>
+                  </a:schemeClr>
+                </a:solidFill>
+              </a:rPr>
+              <a:t>Estimate the parts’ poses using RGB-D images</a:t>
+            </a:r>
+          </a:p>
+          <a:p>
+            <a:pPr lvl="1" algn="l" rtl="0"/>
+            <a:r>
+              <a:rPr lang="en-US" dirty="0">
+                <a:solidFill>
+                  <a:schemeClr val="bg1">
+                    <a:lumMod val="85000"/>
+                  </a:schemeClr>
+                </a:solidFill>
+              </a:rPr>
+              <a:t>Average 10-images to eliminate noise</a:t>
+            </a:r>
+          </a:p>
+          <a:p>
+            <a:pPr lvl="1" algn="l" rtl="0"/>
+            <a:r>
+              <a:rPr lang="en-US" dirty="0">
+                <a:solidFill>
+                  <a:schemeClr val="bg1">
+                    <a:lumMod val="85000"/>
+                  </a:schemeClr>
+                </a:solidFill>
+              </a:rPr>
+              <a:t>Bridge the simulation-reality gap</a:t>
+            </a:r>
+          </a:p>
+          <a:p>
+            <a:pPr marL="514350" indent="-514350" algn="l" rtl="0">
+              <a:buFont typeface="+mj-lt"/>
+              <a:buAutoNum type="arabicPeriod"/>
+            </a:pPr>
+            <a:r>
+              <a:rPr lang="en-US" dirty="0">
+                <a:solidFill>
+                  <a:schemeClr val="bg1">
+                    <a:lumMod val="85000"/>
+                  </a:schemeClr>
+                </a:solidFill>
+              </a:rPr>
+              <a:t>Calculate pick-and-place motions for each part</a:t>
+            </a:r>
+          </a:p>
+          <a:p>
+            <a:pPr lvl="1" algn="l" rtl="0"/>
+            <a:r>
+              <a:rPr lang="en-US" dirty="0">
+                <a:solidFill>
+                  <a:schemeClr val="bg1">
+                    <a:lumMod val="85000"/>
+                  </a:schemeClr>
+                </a:solidFill>
+              </a:rPr>
+              <a:t>‘</a:t>
+            </a:r>
+            <a:r>
+              <a:rPr lang="en-US" dirty="0" err="1">
+                <a:solidFill>
+                  <a:schemeClr val="bg1">
+                    <a:lumMod val="85000"/>
+                  </a:schemeClr>
+                </a:solidFill>
+              </a:rPr>
+              <a:t>Moveit</a:t>
+            </a:r>
+            <a:r>
+              <a:rPr lang="en-US" dirty="0">
+                <a:solidFill>
+                  <a:schemeClr val="bg1">
+                    <a:lumMod val="85000"/>
+                  </a:schemeClr>
+                </a:solidFill>
+              </a:rPr>
+              <a:t>!’ for motion trajectory</a:t>
+            </a:r>
+          </a:p>
+          <a:p>
+            <a:pPr lvl="1" algn="l" rtl="0"/>
+            <a:r>
+              <a:rPr lang="en-US" dirty="0">
+                <a:solidFill>
+                  <a:schemeClr val="bg1">
+                    <a:lumMod val="85000"/>
+                  </a:schemeClr>
+                </a:solidFill>
+              </a:rPr>
+              <a:t>Use prior knowledge to place the parts in the correct location</a:t>
+            </a:r>
+          </a:p>
+          <a:p>
+            <a:pPr marL="514350" indent="-514350" algn="l" rtl="0">
+              <a:buFont typeface="+mj-lt"/>
+              <a:buAutoNum type="arabicPeriod"/>
+            </a:pPr>
+            <a:r>
+              <a:rPr lang="en-US" dirty="0"/>
+              <a:t>Anything you can do, I can do better</a:t>
+            </a:r>
+          </a:p>
+          <a:p>
+            <a:pPr lvl="1" algn="l" rtl="0"/>
+            <a:r>
+              <a:rPr lang="en-US" dirty="0"/>
+              <a:t>Manipulate the robot from the simulation</a:t>
+            </a:r>
+          </a:p>
+        </p:txBody>
+      </p:sp>
+      <p:sp>
+        <p:nvSpPr>
+          <p:cNvPr id="4" name="TextBox 3">
+            <a:extLst>
+              <a:ext uri="{FF2B5EF4-FFF2-40B4-BE49-F238E27FC236}">
+                <a16:creationId xmlns:a16="http://schemas.microsoft.com/office/drawing/2014/main" id="{B1ED8B72-D03D-4B69-916D-BE3A9632DBBB}"/>
+              </a:ext>
+            </a:extLst>
+          </p:cNvPr>
+          <p:cNvSpPr txBox="1"/>
+          <p:nvPr/>
+        </p:nvSpPr>
+        <p:spPr>
+          <a:xfrm>
+            <a:off x="0" y="6492875"/>
+            <a:ext cx="9694898" cy="369332"/>
+          </a:xfrm>
+          <a:prstGeom prst="rect">
+            <a:avLst/>
+          </a:prstGeom>
+          <a:noFill/>
+        </p:spPr>
+        <p:txBody>
+          <a:bodyPr wrap="none" rtlCol="1">
+            <a:spAutoFit/>
+          </a:bodyPr>
+          <a:lstStyle/>
+          <a:p>
             <a:pPr algn="l" rtl="0"/>
             <a:r>
               <a:rPr lang="en-US" dirty="0"/>
-              <a:t>Critical Evaluation</a:t>
-            </a:r>
-            <a:endParaRPr lang="en-IL" dirty="0"/>
-          </a:p>
-        </p:txBody>
-      </p:sp>
-      <p:sp>
-        <p:nvSpPr>
-          <p:cNvPr id="3" name="מציין מיקום תוכן 2">
-            <a:extLst>
-              <a:ext uri="{FF2B5EF4-FFF2-40B4-BE49-F238E27FC236}">
-                <a16:creationId xmlns:a16="http://schemas.microsoft.com/office/drawing/2014/main" id="{DFCD087F-F595-4107-A0D1-8B3A46D67D34}"/>
-              </a:ext>
-            </a:extLst>
-          </p:cNvPr>
-          <p:cNvSpPr>
-            <a:spLocks noGrp="1"/>
-          </p:cNvSpPr>
-          <p:nvPr>
-            <p:ph idx="1"/>
-          </p:nvPr>
-        </p:nvSpPr>
-        <p:spPr/>
-        <p:txBody>
-          <a:bodyPr/>
-          <a:lstStyle/>
-          <a:p>
-            <a:pPr algn="l" rtl="0"/>
+              <a:t>1. Lin, T. Y., Goyal, P., </a:t>
+            </a:r>
+            <a:r>
+              <a:rPr lang="en-US" dirty="0" err="1"/>
+              <a:t>Girshick</a:t>
+            </a:r>
             <a:r>
               <a:rPr lang="en-US" dirty="0"/>
-              <a:t>Each subproblem was solved independently, which will cause more difficult adaption to new domain related problems.</a:t>
-            </a:r>
-          </a:p>
-          <a:p>
-            <a:pPr algn="l" rtl="0"/>
+              <a:t>, R., He, K., &amp; </a:t>
+            </a:r>
+            <a:r>
+              <a:rPr lang="en-US" dirty="0" err="1"/>
+              <a:t>Dollár</a:t>
+            </a:r>
             <a:r>
               <a:rPr lang="en-US" dirty="0"/>
-              <a:t>The solution requires a CAD model – which is rarely accessible to the end user which aims to solve the assembly task.</a:t>
-            </a:r>
-          </a:p>
-          <a:p>
-            <a:pPr algn="l" rtl="0"/>
+              <a:t>, P. (2017). Focal loss for dense object detection. </a:t>
+            </a:r>
+            <a:r>
+              <a:rPr lang="en-US" i="1" dirty="0"/>
+              <a:t>ICCV</a:t>
+            </a:r>
             <a:r>
               <a:rPr lang="en-US" dirty="0"/>
-              <a:t>We would suggest a use of reinforcement learning regarding the grip of the parts.</a:t>
-            </a:r>
-          </a:p>
-          <a:p>
-            <a:pPr algn="l" rtl="0"/>
-            <a:r>
-              <a:rPr lang="en-US" dirty="0"/>
-              <a:t>Expand the use of depth information (e.g., point cloud etc.) in order to avoid the need of CAD models.</a:t>
-            </a:r>
-          </a:p>
-          <a:p>
-            <a:pPr algn="l" rtl="0"/>
-            <a:endParaRPr lang="en-IL" dirty="0"/>
-          </a:p>
-        </p:txBody>
-      </p:sp>
+              <a:t>‏</a:t>
+            </a:r>
+            <a:endParaRPr lang="he-IL" dirty="0"/>
+          </a:p>
+        </p:txBody>
+      </p:sp>
+      <p:pic>
+        <p:nvPicPr>
+          <p:cNvPr id="5" name="Picture 4">
+            <a:extLst>
+              <a:ext uri="{FF2B5EF4-FFF2-40B4-BE49-F238E27FC236}">
+                <a16:creationId xmlns:a16="http://schemas.microsoft.com/office/drawing/2014/main" id="{C865A6E2-1B90-45F2-9C55-9A2DE34E4F54}"/>
+              </a:ext>
+            </a:extLst>
+          </p:cNvPr>
+          <p:cNvPicPr>
+            <a:picLocks noChangeAspect="1"/>
+          </p:cNvPicPr>
+          <p:nvPr/>
+        </p:nvPicPr>
+        <p:blipFill>
+          <a:blip r:embed="rId2"/>
+          <a:stretch>
+            <a:fillRect/>
+          </a:stretch>
+        </p:blipFill>
+        <p:spPr>
+          <a:xfrm>
+            <a:off x="10760319" y="2863420"/>
+            <a:ext cx="1186962" cy="3429000"/>
+          </a:xfrm>
+          <a:prstGeom prst="rect">
+            <a:avLst/>
+          </a:prstGeom>
+        </p:spPr>
+      </p:pic>
+      <p:pic>
+        <p:nvPicPr>
+          <p:cNvPr id="6" name="Picture 5">
+            <a:extLst>
+              <a:ext uri="{FF2B5EF4-FFF2-40B4-BE49-F238E27FC236}">
+                <a16:creationId xmlns:a16="http://schemas.microsoft.com/office/drawing/2014/main" id="{9658A4A7-3550-40DE-9E4A-639EDAD1F28D}"/>
+              </a:ext>
+            </a:extLst>
+          </p:cNvPr>
+          <p:cNvPicPr>
+            <a:picLocks noChangeAspect="1"/>
+          </p:cNvPicPr>
+          <p:nvPr/>
+        </p:nvPicPr>
+        <p:blipFill>
+          <a:blip r:embed="rId3"/>
+          <a:stretch>
+            <a:fillRect/>
+          </a:stretch>
+        </p:blipFill>
+        <p:spPr>
+          <a:xfrm>
+            <a:off x="9413066" y="2863419"/>
+            <a:ext cx="1236419" cy="3429001"/>
+          </a:xfrm>
+          <a:prstGeom prst="rect">
+            <a:avLst/>
+          </a:prstGeom>
+        </p:spPr>
+      </p:pic>
     </p:spTree>
     <p:extLst>
       <p:ext uri="{BB962C8B-B14F-4D97-AF65-F5344CB8AC3E}">
-        <p14:creationId xmlns:p14="http://schemas.microsoft.com/office/powerpoint/2010/main" val="3122920828"/>
+        <p14:creationId xmlns:p14="http://schemas.microsoft.com/office/powerpoint/2010/main" val="3836267592"/>
+      </p:ext>
+    </p:extLst>
+  </p:cSld>
+  <p:clrMapOvr>
+    <a:masterClrMapping/>
+  </p:clrMapOvr>
+</p:sld>
+</file>
+
+<file path=ppt/slides/slide8.xml><?xml version="1.0" encoding="utf-8"?>
+<p:sld xmlns:a="http://schemas.openxmlformats.org/drawingml/2006/main" xmlns:r="http://schemas.openxmlformats.org/officeDocument/2006/relationships" xmlns:p="http://schemas.openxmlformats.org/presentationml/2006/main">
+  <p:cSld>
+    <p:spTree>
+      <p:nvGrpSpPr>
+        <p:cNvPr id="1" name=""/>
+        <p:cNvGrpSpPr/>
+        <p:nvPr/>
+      </p:nvGrpSpPr>
+      <p:grpSpPr>
+        <a:xfrm>
+          <a:off x="0" y="0"/>
+          <a:ext cx="0" cy="0"/>
+          <a:chOff x="0" y="0"/>
+          <a:chExt cx="0" cy="0"/>
+        </a:xfrm>
+      </p:grpSpPr>
+      <p:sp>
+        <p:nvSpPr>
+          <p:cNvPr id="2" name="Title 1">
+            <a:extLst>
+              <a:ext uri="{FF2B5EF4-FFF2-40B4-BE49-F238E27FC236}">
+                <a16:creationId xmlns:a16="http://schemas.microsoft.com/office/drawing/2014/main" id="{EEB95EF7-877B-4D2C-AEDF-1BBFC0140AC4}"/>
+              </a:ext>
+            </a:extLst>
+          </p:cNvPr>
+          <p:cNvSpPr>
+            <a:spLocks noGrp="1"/>
+          </p:cNvSpPr>
+          <p:nvPr>
+            <p:ph type="title"/>
+          </p:nvPr>
+        </p:nvSpPr>
+        <p:spPr/>
+        <p:txBody>
+          <a:bodyPr/>
+          <a:lstStyle/>
+          <a:p>
+            <a:pPr algn="l" rtl="0"/>
+            <a:r>
+              <a:rPr lang="en-US" b="1" dirty="0"/>
+              <a:t>Experiments and Results</a:t>
+            </a:r>
+          </a:p>
+        </p:txBody>
+      </p:sp>
+      <p:sp>
+        <p:nvSpPr>
+          <p:cNvPr id="3" name="Content Placeholder 2">
+            <a:extLst>
+              <a:ext uri="{FF2B5EF4-FFF2-40B4-BE49-F238E27FC236}">
+                <a16:creationId xmlns:a16="http://schemas.microsoft.com/office/drawing/2014/main" id="{1DC9551D-272A-4156-9093-FDD778B14C0E}"/>
+              </a:ext>
+            </a:extLst>
+          </p:cNvPr>
+          <p:cNvSpPr>
+            <a:spLocks noGrp="1"/>
+          </p:cNvSpPr>
+          <p:nvPr>
+            <p:ph idx="1"/>
+          </p:nvPr>
+        </p:nvSpPr>
+        <p:spPr/>
+        <p:txBody>
+          <a:bodyPr>
+            <a:normAutofit/>
+          </a:bodyPr>
+          <a:lstStyle/>
+          <a:p>
+            <a:pPr algn="l" rtl="0"/>
+            <a:r>
+              <a:rPr lang="en-US" dirty="0"/>
+              <a:t>We performed a total of 58 real experiments. </a:t>
+            </a:r>
+          </a:p>
+          <a:p>
+            <a:pPr algn="l" rtl="0"/>
+            <a:r>
+              <a:rPr lang="en-US" dirty="0"/>
+              <a:t>The below table shows the detection, pose estimation and assembly rate accuracy for parts of the </a:t>
+            </a:r>
+            <a:r>
+              <a:rPr lang="en-US" i="1" dirty="0"/>
+              <a:t>Siemens Innovation Challenge.</a:t>
+            </a:r>
+          </a:p>
+          <a:p>
+            <a:pPr algn="l" rtl="0"/>
+            <a:r>
+              <a:rPr lang="en-US" dirty="0"/>
+              <a:t>Pose estimation resulted in an average translational accuracy of 2.16mm and a rotational accuracy of 0.64 degrees. Out of 290 grasps and attempts to assemble, 264 were successful (91%). In 39 experiments, all parts were successfully assembled (67.2%). </a:t>
+            </a:r>
+          </a:p>
+          <a:p>
+            <a:pPr algn="l" rtl="0"/>
+            <a:endParaRPr lang="en-US" dirty="0"/>
+          </a:p>
+        </p:txBody>
+      </p:sp>
+    </p:spTree>
+    <p:extLst>
+      <p:ext uri="{BB962C8B-B14F-4D97-AF65-F5344CB8AC3E}">
+        <p14:creationId xmlns:p14="http://schemas.microsoft.com/office/powerpoint/2010/main" val="2554772813"/>
+      </p:ext>
+    </p:extLst>
+  </p:cSld>
+  <p:clrMapOvr>
+    <a:masterClrMapping/>
+  </p:clrMapOvr>
+</p:sld>
+</file>
+
+<file path=ppt/slides/slide9.xml><?xml version="1.0" encoding="utf-8"?>
+<p:sld xmlns:a="http://schemas.openxmlformats.org/drawingml/2006/main" xmlns:r="http://schemas.openxmlformats.org/officeDocument/2006/relationships" xmlns:p="http://schemas.openxmlformats.org/presentationml/2006/main">
+  <p:cSld>
+    <p:spTree>
+      <p:nvGrpSpPr>
+        <p:cNvPr id="1" name=""/>
+        <p:cNvGrpSpPr/>
+        <p:nvPr/>
+      </p:nvGrpSpPr>
+      <p:grpSpPr>
+        <a:xfrm>
+          <a:off x="0" y="0"/>
+          <a:ext cx="0" cy="0"/>
+          <a:chOff x="0" y="0"/>
+          <a:chExt cx="0" cy="0"/>
+        </a:xfrm>
+      </p:grpSpPr>
+      <p:sp>
+        <p:nvSpPr>
+          <p:cNvPr id="2" name="Title 1">
+            <a:extLst>
+              <a:ext uri="{FF2B5EF4-FFF2-40B4-BE49-F238E27FC236}">
+                <a16:creationId xmlns:a16="http://schemas.microsoft.com/office/drawing/2014/main" id="{EEB95EF7-877B-4D2C-AEDF-1BBFC0140AC4}"/>
+              </a:ext>
+            </a:extLst>
+          </p:cNvPr>
+          <p:cNvSpPr>
+            <a:spLocks noGrp="1"/>
+          </p:cNvSpPr>
+          <p:nvPr>
+            <p:ph type="title"/>
+          </p:nvPr>
+        </p:nvSpPr>
+        <p:spPr/>
+        <p:txBody>
+          <a:bodyPr/>
+          <a:lstStyle/>
+          <a:p>
+            <a:pPr algn="l" rtl="0"/>
+            <a:r>
+              <a:rPr lang="en-US" b="1" dirty="0"/>
+              <a:t>Experiments and Results</a:t>
+            </a:r>
+          </a:p>
+        </p:txBody>
+      </p:sp>
+      <p:sp>
+        <p:nvSpPr>
+          <p:cNvPr id="3" name="Content Placeholder 2">
+            <a:extLst>
+              <a:ext uri="{FF2B5EF4-FFF2-40B4-BE49-F238E27FC236}">
+                <a16:creationId xmlns:a16="http://schemas.microsoft.com/office/drawing/2014/main" id="{1DC9551D-272A-4156-9093-FDD778B14C0E}"/>
+              </a:ext>
+            </a:extLst>
+          </p:cNvPr>
+          <p:cNvSpPr>
+            <a:spLocks noGrp="1"/>
+          </p:cNvSpPr>
+          <p:nvPr>
+            <p:ph idx="1"/>
+          </p:nvPr>
+        </p:nvSpPr>
+        <p:spPr/>
+        <p:txBody>
+          <a:bodyPr>
+            <a:normAutofit/>
+          </a:bodyPr>
+          <a:lstStyle/>
+          <a:p>
+            <a:pPr algn="l" rtl="0"/>
+            <a:r>
+              <a:rPr lang="en-US" dirty="0"/>
+              <a:t>Total of 58</a:t>
+            </a:r>
+          </a:p>
+        </p:txBody>
+      </p:sp>
+      <p:pic>
+        <p:nvPicPr>
+          <p:cNvPr id="4" name="Picture 3">
+            <a:extLst>
+              <a:ext uri="{FF2B5EF4-FFF2-40B4-BE49-F238E27FC236}">
+                <a16:creationId xmlns:a16="http://schemas.microsoft.com/office/drawing/2014/main" id="{54C900D0-34C0-49F0-84E2-E0C252BE5E1D}"/>
+              </a:ext>
+            </a:extLst>
+          </p:cNvPr>
+          <p:cNvPicPr>
+            <a:picLocks noChangeAspect="1"/>
+          </p:cNvPicPr>
+          <p:nvPr/>
+        </p:nvPicPr>
+        <p:blipFill>
+          <a:blip r:embed="rId2"/>
+          <a:stretch>
+            <a:fillRect/>
+          </a:stretch>
+        </p:blipFill>
+        <p:spPr>
+          <a:xfrm>
+            <a:off x="0" y="3051717"/>
+            <a:ext cx="12192000" cy="3806283"/>
+          </a:xfrm>
+          <a:prstGeom prst="rect">
+            <a:avLst/>
+          </a:prstGeom>
+        </p:spPr>
+      </p:pic>
+    </p:spTree>
+    <p:extLst>
+      <p:ext uri="{BB962C8B-B14F-4D97-AF65-F5344CB8AC3E}">
+        <p14:creationId xmlns:p14="http://schemas.microsoft.com/office/powerpoint/2010/main" val="712467019"/>
       </p:ext>
     </p:extLst>
   </p:cSld>

</xml_diff>

<commit_message>
editing the presentation towards Sunday
</commit_message>
<xml_diff>
--- a/FinalProject/FinalProject.pptx
+++ b/FinalProject/FinalProject.pptx
@@ -207,7 +207,7 @@
           <a:p>
             <a:fld id="{88F23410-BFAF-48E3-A241-BB7B6FC86D10}" type="datetimeFigureOut">
               <a:rPr lang="he-IL" smtClean="0"/>
-              <a:t>י"ח/כסלו/תשפ"ב</a:t>
+              <a:t>כ"ג/כסלו/תשפ"ב</a:t>
             </a:fld>
             <a:endParaRPr lang="he-IL"/>
           </a:p>
@@ -559,6 +559,90 @@
 </p:notes>
 </file>
 
+<file path=ppt/notesSlides/notesSlide2.xml><?xml version="1.0" encoding="utf-8"?>
+<p:notes xmlns:a="http://schemas.openxmlformats.org/drawingml/2006/main" xmlns:r="http://schemas.openxmlformats.org/officeDocument/2006/relationships" xmlns:p="http://schemas.openxmlformats.org/presentationml/2006/main">
+  <p:cSld>
+    <p:spTree>
+      <p:nvGrpSpPr>
+        <p:cNvPr id="1" name=""/>
+        <p:cNvGrpSpPr/>
+        <p:nvPr/>
+      </p:nvGrpSpPr>
+      <p:grpSpPr>
+        <a:xfrm>
+          <a:off x="0" y="0"/>
+          <a:ext cx="0" cy="0"/>
+          <a:chOff x="0" y="0"/>
+          <a:chExt cx="0" cy="0"/>
+        </a:xfrm>
+      </p:grpSpPr>
+      <p:sp>
+        <p:nvSpPr>
+          <p:cNvPr id="2" name="Slide Image Placeholder 1"/>
+          <p:cNvSpPr>
+            <a:spLocks noGrp="1" noRot="1" noChangeAspect="1"/>
+          </p:cNvSpPr>
+          <p:nvPr>
+            <p:ph type="sldImg"/>
+          </p:nvPr>
+        </p:nvSpPr>
+        <p:spPr/>
+      </p:sp>
+      <p:sp>
+        <p:nvSpPr>
+          <p:cNvPr id="3" name="Notes Placeholder 2"/>
+          <p:cNvSpPr>
+            <a:spLocks noGrp="1"/>
+          </p:cNvSpPr>
+          <p:nvPr>
+            <p:ph type="body" idx="1"/>
+          </p:nvPr>
+        </p:nvSpPr>
+        <p:spPr/>
+        <p:txBody>
+          <a:bodyPr/>
+          <a:lstStyle/>
+          <a:p>
+            <a:endParaRPr lang="he-IL" dirty="0"/>
+          </a:p>
+        </p:txBody>
+      </p:sp>
+      <p:sp>
+        <p:nvSpPr>
+          <p:cNvPr id="4" name="Slide Number Placeholder 3"/>
+          <p:cNvSpPr>
+            <a:spLocks noGrp="1"/>
+          </p:cNvSpPr>
+          <p:nvPr>
+            <p:ph type="sldNum" sz="quarter" idx="5"/>
+          </p:nvPr>
+        </p:nvSpPr>
+        <p:spPr/>
+        <p:txBody>
+          <a:bodyPr/>
+          <a:lstStyle/>
+          <a:p>
+            <a:fld id="{DF98F391-624E-4221-867F-9C1952C38DA3}" type="slidenum">
+              <a:rPr lang="he-IL" smtClean="0"/>
+              <a:t>5</a:t>
+            </a:fld>
+            <a:endParaRPr lang="he-IL"/>
+          </a:p>
+        </p:txBody>
+      </p:sp>
+    </p:spTree>
+    <p:extLst>
+      <p:ext uri="{BB962C8B-B14F-4D97-AF65-F5344CB8AC3E}">
+        <p14:creationId xmlns:p14="http://schemas.microsoft.com/office/powerpoint/2010/main" val="3348216381"/>
+      </p:ext>
+    </p:extLst>
+  </p:cSld>
+  <p:clrMapOvr>
+    <a:masterClrMapping/>
+  </p:clrMapOvr>
+</p:notes>
+</file>
+
 <file path=ppt/slideLayouts/slideLayout1.xml><?xml version="1.0" encoding="utf-8"?>
 <p:sldLayout xmlns:a="http://schemas.openxmlformats.org/drawingml/2006/main" xmlns:r="http://schemas.openxmlformats.org/officeDocument/2006/relationships" xmlns:p="http://schemas.openxmlformats.org/presentationml/2006/main" type="title" preserve="1">
   <p:cSld name="שקופית כותרת">
@@ -708,7 +792,7 @@
           <a:p>
             <a:fld id="{0FBF1EB2-CB17-4A79-9466-7C3708736DBA}" type="datetimeFigureOut">
               <a:rPr lang="en-IL" smtClean="0"/>
-              <a:t>11/22/2021</a:t>
+              <a:t>11/27/2021</a:t>
             </a:fld>
             <a:endParaRPr lang="en-IL"/>
           </a:p>
@@ -908,7 +992,7 @@
           <a:p>
             <a:fld id="{0FBF1EB2-CB17-4A79-9466-7C3708736DBA}" type="datetimeFigureOut">
               <a:rPr lang="en-IL" smtClean="0"/>
-              <a:t>11/22/2021</a:t>
+              <a:t>11/27/2021</a:t>
             </a:fld>
             <a:endParaRPr lang="en-IL"/>
           </a:p>
@@ -1118,7 +1202,7 @@
           <a:p>
             <a:fld id="{0FBF1EB2-CB17-4A79-9466-7C3708736DBA}" type="datetimeFigureOut">
               <a:rPr lang="en-IL" smtClean="0"/>
-              <a:t>11/22/2021</a:t>
+              <a:t>11/27/2021</a:t>
             </a:fld>
             <a:endParaRPr lang="en-IL"/>
           </a:p>
@@ -1318,7 +1402,7 @@
           <a:p>
             <a:fld id="{0FBF1EB2-CB17-4A79-9466-7C3708736DBA}" type="datetimeFigureOut">
               <a:rPr lang="en-IL" smtClean="0"/>
-              <a:t>11/22/2021</a:t>
+              <a:t>11/27/2021</a:t>
             </a:fld>
             <a:endParaRPr lang="en-IL"/>
           </a:p>
@@ -1594,7 +1678,7 @@
           <a:p>
             <a:fld id="{0FBF1EB2-CB17-4A79-9466-7C3708736DBA}" type="datetimeFigureOut">
               <a:rPr lang="en-IL" smtClean="0"/>
-              <a:t>11/22/2021</a:t>
+              <a:t>11/27/2021</a:t>
             </a:fld>
             <a:endParaRPr lang="en-IL"/>
           </a:p>
@@ -1862,7 +1946,7 @@
           <a:p>
             <a:fld id="{0FBF1EB2-CB17-4A79-9466-7C3708736DBA}" type="datetimeFigureOut">
               <a:rPr lang="en-IL" smtClean="0"/>
-              <a:t>11/22/2021</a:t>
+              <a:t>11/27/2021</a:t>
             </a:fld>
             <a:endParaRPr lang="en-IL"/>
           </a:p>
@@ -2277,7 +2361,7 @@
           <a:p>
             <a:fld id="{0FBF1EB2-CB17-4A79-9466-7C3708736DBA}" type="datetimeFigureOut">
               <a:rPr lang="en-IL" smtClean="0"/>
-              <a:t>11/22/2021</a:t>
+              <a:t>11/27/2021</a:t>
             </a:fld>
             <a:endParaRPr lang="en-IL"/>
           </a:p>
@@ -2419,7 +2503,7 @@
           <a:p>
             <a:fld id="{0FBF1EB2-CB17-4A79-9466-7C3708736DBA}" type="datetimeFigureOut">
               <a:rPr lang="en-IL" smtClean="0"/>
-              <a:t>11/22/2021</a:t>
+              <a:t>11/27/2021</a:t>
             </a:fld>
             <a:endParaRPr lang="en-IL"/>
           </a:p>
@@ -2532,7 +2616,7 @@
           <a:p>
             <a:fld id="{0FBF1EB2-CB17-4A79-9466-7C3708736DBA}" type="datetimeFigureOut">
               <a:rPr lang="en-IL" smtClean="0"/>
-              <a:t>11/22/2021</a:t>
+              <a:t>11/27/2021</a:t>
             </a:fld>
             <a:endParaRPr lang="en-IL"/>
           </a:p>
@@ -2845,7 +2929,7 @@
           <a:p>
             <a:fld id="{0FBF1EB2-CB17-4A79-9466-7C3708736DBA}" type="datetimeFigureOut">
               <a:rPr lang="en-IL" smtClean="0"/>
-              <a:t>11/22/2021</a:t>
+              <a:t>11/27/2021</a:t>
             </a:fld>
             <a:endParaRPr lang="en-IL"/>
           </a:p>
@@ -3134,7 +3218,7 @@
           <a:p>
             <a:fld id="{0FBF1EB2-CB17-4A79-9466-7C3708736DBA}" type="datetimeFigureOut">
               <a:rPr lang="en-IL" smtClean="0"/>
-              <a:t>11/22/2021</a:t>
+              <a:t>11/27/2021</a:t>
             </a:fld>
             <a:endParaRPr lang="en-IL"/>
           </a:p>
@@ -3377,7 +3461,7 @@
           <a:p>
             <a:fld id="{0FBF1EB2-CB17-4A79-9466-7C3708736DBA}" type="datetimeFigureOut">
               <a:rPr lang="en-IL" smtClean="0"/>
-              <a:t>11/22/2021</a:t>
+              <a:t>11/27/2021</a:t>
             </a:fld>
             <a:endParaRPr lang="en-IL"/>
           </a:p>
@@ -4808,8 +4892,8 @@
               </a:lnSpc>
             </a:pPr>
             <a:r>
-              <a:rPr lang="en-US" sz="3000" dirty="0"/>
-              <a:t>solving a generic assembly task</a:t>
+              <a:rPr lang="en-US" sz="3200" dirty="0"/>
+              <a:t>Solving a generic assembly task</a:t>
             </a:r>
           </a:p>
           <a:p>
@@ -5058,7 +5142,7 @@
             <a:pPr algn="l" rtl="0"/>
             <a:r>
               <a:rPr lang="en-US" dirty="0"/>
-              <a:t>Bottom line  - observe, detect, grasp, assemble</a:t>
+              <a:t>Bottom line – observe, detect, grasp, assemble</a:t>
             </a:r>
           </a:p>
           <a:p>
@@ -6237,7 +6321,7 @@
           <p:nvPr/>
         </p:nvPicPr>
         <p:blipFill>
-          <a:blip r:embed="rId2"/>
+          <a:blip r:embed="rId3"/>
           <a:stretch>
             <a:fillRect/>
           </a:stretch>
@@ -6267,7 +6351,7 @@
           <p:nvPr/>
         </p:nvPicPr>
         <p:blipFill>
-          <a:blip r:embed="rId3"/>
+          <a:blip r:embed="rId4"/>
           <a:stretch>
             <a:fillRect/>
           </a:stretch>
@@ -6297,7 +6381,7 @@
           <p:nvPr/>
         </p:nvPicPr>
         <p:blipFill>
-          <a:blip r:embed="rId4"/>
+          <a:blip r:embed="rId5"/>
           <a:stretch>
             <a:fillRect/>
           </a:stretch>
@@ -6327,7 +6411,7 @@
           <p:nvPr/>
         </p:nvPicPr>
         <p:blipFill>
-          <a:blip r:embed="rId5"/>
+          <a:blip r:embed="rId6"/>
           <a:stretch>
             <a:fillRect/>
           </a:stretch>
@@ -6695,6 +6779,80 @@
           </a:p>
         </p:txBody>
       </p:sp>
+      <p:sp>
+        <p:nvSpPr>
+          <p:cNvPr id="12" name="TextBox 11">
+            <a:extLst>
+              <a:ext uri="{FF2B5EF4-FFF2-40B4-BE49-F238E27FC236}">
+                <a16:creationId xmlns:a16="http://schemas.microsoft.com/office/drawing/2014/main" id="{EFF93802-128E-418F-AA77-43E4B51136B3}"/>
+              </a:ext>
+            </a:extLst>
+          </p:cNvPr>
+          <p:cNvSpPr txBox="1"/>
+          <p:nvPr/>
+        </p:nvSpPr>
+        <p:spPr>
+          <a:xfrm>
+            <a:off x="7486106" y="4326963"/>
+            <a:ext cx="585417" cy="369332"/>
+          </a:xfrm>
+          <a:prstGeom prst="rect">
+            <a:avLst/>
+          </a:prstGeom>
+          <a:noFill/>
+        </p:spPr>
+        <p:txBody>
+          <a:bodyPr wrap="none" rtlCol="1">
+            <a:spAutoFit/>
+          </a:bodyPr>
+          <a:lstStyle/>
+          <a:p>
+            <a:pPr algn="l" rtl="0"/>
+            <a:r>
+              <a:rPr lang="en-US" dirty="0"/>
+              <a:t>Sim.</a:t>
+            </a:r>
+            <a:endParaRPr lang="he-IL" dirty="0"/>
+          </a:p>
+        </p:txBody>
+      </p:sp>
+      <p:sp>
+        <p:nvSpPr>
+          <p:cNvPr id="13" name="TextBox 12">
+            <a:extLst>
+              <a:ext uri="{FF2B5EF4-FFF2-40B4-BE49-F238E27FC236}">
+                <a16:creationId xmlns:a16="http://schemas.microsoft.com/office/drawing/2014/main" id="{F799F995-0EB2-4853-BEE1-4C3F44A589F7}"/>
+              </a:ext>
+            </a:extLst>
+          </p:cNvPr>
+          <p:cNvSpPr txBox="1"/>
+          <p:nvPr/>
+        </p:nvSpPr>
+        <p:spPr>
+          <a:xfrm>
+            <a:off x="7369503" y="5612296"/>
+            <a:ext cx="818622" cy="369332"/>
+          </a:xfrm>
+          <a:prstGeom prst="rect">
+            <a:avLst/>
+          </a:prstGeom>
+          <a:noFill/>
+        </p:spPr>
+        <p:txBody>
+          <a:bodyPr wrap="none" rtlCol="1">
+            <a:spAutoFit/>
+          </a:bodyPr>
+          <a:lstStyle/>
+          <a:p>
+            <a:pPr algn="l" rtl="0"/>
+            <a:r>
+              <a:rPr lang="en-US" dirty="0"/>
+              <a:t>Reality</a:t>
+            </a:r>
+            <a:endParaRPr lang="he-IL" dirty="0"/>
+          </a:p>
+        </p:txBody>
+      </p:sp>
     </p:spTree>
     <p:extLst>
       <p:ext uri="{BB962C8B-B14F-4D97-AF65-F5344CB8AC3E}">
@@ -6795,6 +6953,76 @@
                                   </p:childTnLst>
                                 </p:cTn>
                               </p:par>
+                              <p:par>
+                                <p:cTn id="11" presetID="10" presetClass="entr" presetSubtype="0" fill="hold" grpId="0" nodeType="withEffect">
+                                  <p:stCondLst>
+                                    <p:cond delay="0"/>
+                                  </p:stCondLst>
+                                  <p:childTnLst>
+                                    <p:set>
+                                      <p:cBhvr>
+                                        <p:cTn id="12" dur="1" fill="hold">
+                                          <p:stCondLst>
+                                            <p:cond delay="0"/>
+                                          </p:stCondLst>
+                                        </p:cTn>
+                                        <p:tgtEl>
+                                          <p:spTgt spid="12"/>
+                                        </p:tgtEl>
+                                        <p:attrNameLst>
+                                          <p:attrName>style.visibility</p:attrName>
+                                        </p:attrNameLst>
+                                      </p:cBhvr>
+                                      <p:to>
+                                        <p:strVal val="visible"/>
+                                      </p:to>
+                                    </p:set>
+                                    <p:animEffect transition="in" filter="fade">
+                                      <p:cBhvr>
+                                        <p:cTn id="13" dur="500"/>
+                                        <p:tgtEl>
+                                          <p:spTgt spid="12"/>
+                                        </p:tgtEl>
+                                      </p:cBhvr>
+                                    </p:animEffect>
+                                  </p:childTnLst>
+                                </p:cTn>
+                              </p:par>
+                              <p:par>
+                                <p:cTn id="14" presetID="10" presetClass="entr" presetSubtype="0" fill="hold" grpId="0" nodeType="withEffect">
+                                  <p:stCondLst>
+                                    <p:cond delay="0"/>
+                                  </p:stCondLst>
+                                  <p:childTnLst>
+                                    <p:set>
+                                      <p:cBhvr>
+                                        <p:cTn id="15" dur="1" fill="hold">
+                                          <p:stCondLst>
+                                            <p:cond delay="0"/>
+                                          </p:stCondLst>
+                                        </p:cTn>
+                                        <p:tgtEl>
+                                          <p:spTgt spid="13"/>
+                                        </p:tgtEl>
+                                        <p:attrNameLst>
+                                          <p:attrName>style.visibility</p:attrName>
+                                        </p:attrNameLst>
+                                      </p:cBhvr>
+                                      <p:to>
+                                        <p:strVal val="visible"/>
+                                      </p:to>
+                                    </p:set>
+                                    <p:animEffect transition="in" filter="fade">
+                                      <p:cBhvr>
+                                        <p:cTn id="16" dur="500"/>
+                                        <p:tgtEl>
+                                          <p:spTgt spid="13"/>
+                                        </p:tgtEl>
+                                      </p:cBhvr>
+                                    </p:animEffect>
+                                  </p:childTnLst>
+                                </p:cTn>
+                              </p:par>
                             </p:childTnLst>
                           </p:cTn>
                         </p:par>
@@ -6825,6 +7053,8 @@
     <p:bldLst>
       <p:bldP spid="10" grpId="0"/>
       <p:bldP spid="11" grpId="0"/>
+      <p:bldP spid="12" grpId="0"/>
+      <p:bldP spid="13" grpId="0"/>
     </p:bldLst>
   </p:timing>
 </p:sld>
@@ -7286,6 +7516,13 @@
             <a:pPr lvl="1" algn="l" rtl="0"/>
             <a:r>
               <a:rPr lang="en-US" dirty="0"/>
+              <a:t>Use prior knowledge to place the parts in the correct location</a:t>
+            </a:r>
+          </a:p>
+          <a:p>
+            <a:pPr lvl="1" algn="l" rtl="0"/>
+            <a:r>
+              <a:rPr lang="en-US" dirty="0"/>
               <a:t>‘</a:t>
             </a:r>
             <a:r>
@@ -7295,13 +7532,6 @@
             <a:r>
               <a:rPr lang="en-US" dirty="0"/>
               <a:t>!’ for motion trajectory</a:t>
-            </a:r>
-          </a:p>
-          <a:p>
-            <a:pPr lvl="1" algn="l" rtl="0"/>
-            <a:r>
-              <a:rPr lang="en-US" dirty="0"/>
-              <a:t>Use prior knowledge to place the parts in the correct location</a:t>
             </a:r>
           </a:p>
         </p:txBody>
@@ -7660,6 +7890,26 @@
                   </a:schemeClr>
                 </a:solidFill>
               </a:rPr>
+              <a:t>Use prior knowledge to place the parts in the correct location</a:t>
+            </a:r>
+            <a:endParaRPr lang="en-US" b="1" dirty="0">
+              <a:solidFill>
+                <a:schemeClr val="bg1">
+                  <a:lumMod val="85000"/>
+                </a:schemeClr>
+              </a:solidFill>
+            </a:endParaRPr>
+          </a:p>
+          <a:p>
+            <a:pPr lvl="1" algn="l" rtl="0"/>
+            <a:r>
+              <a:rPr lang="en-US" dirty="0">
+                <a:solidFill>
+                  <a:schemeClr val="bg1">
+                    <a:lumMod val="85000"/>
+                  </a:schemeClr>
+                </a:solidFill>
+              </a:rPr>
               <a:t>‘</a:t>
             </a:r>
             <a:r>
@@ -7681,19 +7931,6 @@
                 </a:solidFill>
               </a:rPr>
               <a:t>!’ for motion trajectory</a:t>
-            </a:r>
-          </a:p>
-          <a:p>
-            <a:pPr lvl="1" algn="l" rtl="0"/>
-            <a:r>
-              <a:rPr lang="en-US" dirty="0">
-                <a:solidFill>
-                  <a:schemeClr val="bg1">
-                    <a:lumMod val="85000"/>
-                  </a:schemeClr>
-                </a:solidFill>
-              </a:rPr>
-              <a:t>Use prior knowledge to place the parts in the correct location</a:t>
             </a:r>
           </a:p>
           <a:p>
@@ -7926,7 +8163,7 @@
             <a:pPr algn="l" rtl="0"/>
             <a:r>
               <a:rPr lang="en-US" dirty="0"/>
-              <a:t>58 assembly attempts with s success rate of 67.2%</a:t>
+              <a:t>58 assembly attempts with a success rate of 67.2%</a:t>
             </a:r>
           </a:p>
           <a:p>

</xml_diff>